<commit_message>
Revised instructions and rubrics
</commit_message>
<xml_diff>
--- a/Notes and Slides/CIS399Wk4Day1-WebServices+kSOAP.pptx
+++ b/Notes and Slides/CIS399Wk4Day1-WebServices+kSOAP.pptx
@@ -5,7 +5,7 @@
     <p:sldMasterId id="2147483648" r:id="rId1"/>
   </p:sldMasterIdLst>
   <p:notesMasterIdLst>
-    <p:notesMasterId r:id="rId25"/>
+    <p:notesMasterId r:id="rId27"/>
   </p:notesMasterIdLst>
   <p:sldIdLst>
     <p:sldId id="269" r:id="rId2"/>
@@ -15,22 +15,24 @@
     <p:sldId id="450" r:id="rId6"/>
     <p:sldId id="451" r:id="rId7"/>
     <p:sldId id="452" r:id="rId8"/>
-    <p:sldId id="453" r:id="rId9"/>
-    <p:sldId id="454" r:id="rId10"/>
-    <p:sldId id="455" r:id="rId11"/>
-    <p:sldId id="456" r:id="rId12"/>
-    <p:sldId id="457" r:id="rId13"/>
-    <p:sldId id="458" r:id="rId14"/>
-    <p:sldId id="448" r:id="rId15"/>
-    <p:sldId id="461" r:id="rId16"/>
-    <p:sldId id="462" r:id="rId17"/>
-    <p:sldId id="463" r:id="rId18"/>
-    <p:sldId id="464" r:id="rId19"/>
-    <p:sldId id="465" r:id="rId20"/>
-    <p:sldId id="466" r:id="rId21"/>
-    <p:sldId id="467" r:id="rId22"/>
-    <p:sldId id="468" r:id="rId23"/>
-    <p:sldId id="392" r:id="rId24"/>
+    <p:sldId id="448" r:id="rId9"/>
+    <p:sldId id="470" r:id="rId10"/>
+    <p:sldId id="453" r:id="rId11"/>
+    <p:sldId id="454" r:id="rId12"/>
+    <p:sldId id="455" r:id="rId13"/>
+    <p:sldId id="456" r:id="rId14"/>
+    <p:sldId id="457" r:id="rId15"/>
+    <p:sldId id="458" r:id="rId16"/>
+    <p:sldId id="469" r:id="rId17"/>
+    <p:sldId id="461" r:id="rId18"/>
+    <p:sldId id="462" r:id="rId19"/>
+    <p:sldId id="463" r:id="rId20"/>
+    <p:sldId id="464" r:id="rId21"/>
+    <p:sldId id="465" r:id="rId22"/>
+    <p:sldId id="466" r:id="rId23"/>
+    <p:sldId id="467" r:id="rId24"/>
+    <p:sldId id="468" r:id="rId25"/>
+    <p:sldId id="392" r:id="rId26"/>
   </p:sldIdLst>
   <p:sldSz cx="9144000" cy="6858000" type="screen4x3"/>
   <p:notesSz cx="6858000" cy="9144000"/>
@@ -131,7 +133,7 @@
   </p:defaultTextStyle>
   <p:extLst>
     <p:ext uri="{EFAFB233-063F-42B5-8137-9DF3F51BA10A}">
-      <p15:sldGuideLst xmlns:p15="http://schemas.microsoft.com/office/powerpoint/2012/main" xmlns="">
+      <p15:sldGuideLst xmlns:p15="http://schemas.microsoft.com/office/powerpoint/2012/main">
         <p15:guide id="1" orient="horz" pos="2160">
           <p15:clr>
             <a:srgbClr val="A4A3A4"/>
@@ -230,7 +232,7 @@
           <a:p>
             <a:fld id="{1FC32AA1-1225-9048-80C3-2B6F58548154}" type="datetimeFigureOut">
               <a:rPr lang="en-US" smtClean="0"/>
-              <a:t>7/12/16</a:t>
+              <a:t>7/17/17</a:t>
             </a:fld>
             <a:endParaRPr lang="en-US"/>
           </a:p>
@@ -655,7 +657,7 @@
           <a:p>
             <a:fld id="{44EB6C7D-DFD8-944D-93E3-D07F7EBDDEA8}" type="slidenum">
               <a:rPr lang="en-US" smtClean="0"/>
-              <a:t>21</a:t>
+              <a:t>22</a:t>
             </a:fld>
             <a:endParaRPr lang="en-US"/>
           </a:p>
@@ -739,7 +741,91 @@
           <a:p>
             <a:fld id="{44EB6C7D-DFD8-944D-93E3-D07F7EBDDEA8}" type="slidenum">
               <a:rPr lang="en-US" smtClean="0"/>
-              <a:t>22</a:t>
+              <a:t>23</a:t>
+            </a:fld>
+            <a:endParaRPr lang="en-US"/>
+          </a:p>
+        </p:txBody>
+      </p:sp>
+    </p:spTree>
+    <p:extLst>
+      <p:ext uri="{BB962C8B-B14F-4D97-AF65-F5344CB8AC3E}">
+        <p14:creationId xmlns:p14="http://schemas.microsoft.com/office/powerpoint/2010/main" val="2094514162"/>
+      </p:ext>
+    </p:extLst>
+  </p:cSld>
+  <p:clrMapOvr>
+    <a:masterClrMapping/>
+  </p:clrMapOvr>
+</p:notes>
+</file>
+
+<file path=ppt/notesSlides/notesSlide12.xml><?xml version="1.0" encoding="utf-8"?>
+<p:notes xmlns:a="http://schemas.openxmlformats.org/drawingml/2006/main" xmlns:r="http://schemas.openxmlformats.org/officeDocument/2006/relationships" xmlns:p="http://schemas.openxmlformats.org/presentationml/2006/main">
+  <p:cSld>
+    <p:spTree>
+      <p:nvGrpSpPr>
+        <p:cNvPr id="1" name=""/>
+        <p:cNvGrpSpPr/>
+        <p:nvPr/>
+      </p:nvGrpSpPr>
+      <p:grpSpPr>
+        <a:xfrm>
+          <a:off x="0" y="0"/>
+          <a:ext cx="0" cy="0"/>
+          <a:chOff x="0" y="0"/>
+          <a:chExt cx="0" cy="0"/>
+        </a:xfrm>
+      </p:grpSpPr>
+      <p:sp>
+        <p:nvSpPr>
+          <p:cNvPr id="2" name="Slide Image Placeholder 1"/>
+          <p:cNvSpPr>
+            <a:spLocks noGrp="1" noRot="1" noChangeAspect="1"/>
+          </p:cNvSpPr>
+          <p:nvPr>
+            <p:ph type="sldImg"/>
+          </p:nvPr>
+        </p:nvSpPr>
+        <p:spPr/>
+      </p:sp>
+      <p:sp>
+        <p:nvSpPr>
+          <p:cNvPr id="3" name="Notes Placeholder 2"/>
+          <p:cNvSpPr>
+            <a:spLocks noGrp="1"/>
+          </p:cNvSpPr>
+          <p:nvPr>
+            <p:ph type="body" idx="1"/>
+          </p:nvPr>
+        </p:nvSpPr>
+        <p:spPr/>
+        <p:txBody>
+          <a:bodyPr/>
+          <a:lstStyle/>
+          <a:p>
+            <a:endParaRPr lang="en-US" dirty="0"/>
+          </a:p>
+        </p:txBody>
+      </p:sp>
+      <p:sp>
+        <p:nvSpPr>
+          <p:cNvPr id="4" name="Slide Number Placeholder 3"/>
+          <p:cNvSpPr>
+            <a:spLocks noGrp="1"/>
+          </p:cNvSpPr>
+          <p:nvPr>
+            <p:ph type="sldNum" sz="quarter" idx="10"/>
+          </p:nvPr>
+        </p:nvSpPr>
+        <p:spPr/>
+        <p:txBody>
+          <a:bodyPr/>
+          <a:lstStyle/>
+          <a:p>
+            <a:fld id="{44EB6C7D-DFD8-944D-93E3-D07F7EBDDEA8}" type="slidenum">
+              <a:rPr lang="en-US" smtClean="0"/>
+              <a:t>24</a:t>
             </a:fld>
             <a:endParaRPr lang="en-US"/>
           </a:p>
@@ -894,6 +980,28 @@
           <a:bodyPr/>
           <a:lstStyle/>
           <a:p>
+            <a:r>
+              <a:rPr lang="en-US" dirty="0" smtClean="0"/>
+              <a:t>http://</a:t>
+            </a:r>
+            <a:r>
+              <a:rPr lang="en-US" dirty="0" err="1" smtClean="0"/>
+              <a:t>api.wunderground.com</a:t>
+            </a:r>
+            <a:r>
+              <a:rPr lang="en-US" dirty="0" smtClean="0"/>
+              <a:t>/weather/</a:t>
+            </a:r>
+            <a:r>
+              <a:rPr lang="en-US" dirty="0" err="1" smtClean="0"/>
+              <a:t>api</a:t>
+            </a:r>
+            <a:r>
+              <a:rPr lang="en-US" dirty="0" smtClean="0"/>
+              <a:t>/d/docs</a:t>
+            </a:r>
+          </a:p>
+          <a:p>
             <a:endParaRPr lang="en-US" dirty="0"/>
           </a:p>
         </p:txBody>
@@ -915,7 +1023,7 @@
           <a:p>
             <a:fld id="{44EB6C7D-DFD8-944D-93E3-D07F7EBDDEA8}" type="slidenum">
               <a:rPr lang="en-US" smtClean="0"/>
-              <a:t>14</a:t>
+              <a:t>8</a:t>
             </a:fld>
             <a:endParaRPr lang="en-US"/>
           </a:p>
@@ -999,7 +1107,7 @@
           <a:p>
             <a:fld id="{44EB6C7D-DFD8-944D-93E3-D07F7EBDDEA8}" type="slidenum">
               <a:rPr lang="en-US" smtClean="0"/>
-              <a:t>15</a:t>
+              <a:t>16</a:t>
             </a:fld>
             <a:endParaRPr lang="en-US"/>
           </a:p>
@@ -1008,7 +1116,7 @@
     </p:spTree>
     <p:extLst>
       <p:ext uri="{BB962C8B-B14F-4D97-AF65-F5344CB8AC3E}">
-        <p14:creationId xmlns:p14="http://schemas.microsoft.com/office/powerpoint/2010/main" val="2094514162"/>
+        <p14:creationId xmlns:p14="http://schemas.microsoft.com/office/powerpoint/2010/main" val="2130505189"/>
       </p:ext>
     </p:extLst>
   </p:cSld>
@@ -1083,7 +1191,7 @@
           <a:p>
             <a:fld id="{44EB6C7D-DFD8-944D-93E3-D07F7EBDDEA8}" type="slidenum">
               <a:rPr lang="en-US" smtClean="0"/>
-              <a:t>16</a:t>
+              <a:t>17</a:t>
             </a:fld>
             <a:endParaRPr lang="en-US"/>
           </a:p>
@@ -1167,7 +1275,7 @@
           <a:p>
             <a:fld id="{44EB6C7D-DFD8-944D-93E3-D07F7EBDDEA8}" type="slidenum">
               <a:rPr lang="en-US" smtClean="0"/>
-              <a:t>17</a:t>
+              <a:t>18</a:t>
             </a:fld>
             <a:endParaRPr lang="en-US"/>
           </a:p>
@@ -1251,7 +1359,7 @@
           <a:p>
             <a:fld id="{44EB6C7D-DFD8-944D-93E3-D07F7EBDDEA8}" type="slidenum">
               <a:rPr lang="en-US" smtClean="0"/>
-              <a:t>18</a:t>
+              <a:t>19</a:t>
             </a:fld>
             <a:endParaRPr lang="en-US"/>
           </a:p>
@@ -1335,7 +1443,7 @@
           <a:p>
             <a:fld id="{44EB6C7D-DFD8-944D-93E3-D07F7EBDDEA8}" type="slidenum">
               <a:rPr lang="en-US" smtClean="0"/>
-              <a:t>19</a:t>
+              <a:t>20</a:t>
             </a:fld>
             <a:endParaRPr lang="en-US"/>
           </a:p>
@@ -1419,7 +1527,7 @@
           <a:p>
             <a:fld id="{44EB6C7D-DFD8-944D-93E3-D07F7EBDDEA8}" type="slidenum">
               <a:rPr lang="en-US" smtClean="0"/>
-              <a:t>20</a:t>
+              <a:t>21</a:t>
             </a:fld>
             <a:endParaRPr lang="en-US"/>
           </a:p>
@@ -1619,7 +1727,7 @@
           <a:p>
             <a:fld id="{12110144-19AD-4D4E-902D-E18AF93089D3}" type="datetimeFigureOut">
               <a:rPr lang="en-US" smtClean="0"/>
-              <a:t>7/12/16</a:t>
+              <a:t>7/17/17</a:t>
             </a:fld>
             <a:endParaRPr lang="en-US"/>
           </a:p>
@@ -1789,7 +1897,7 @@
           <a:p>
             <a:fld id="{12110144-19AD-4D4E-902D-E18AF93089D3}" type="datetimeFigureOut">
               <a:rPr lang="en-US" smtClean="0"/>
-              <a:t>7/12/16</a:t>
+              <a:t>7/17/17</a:t>
             </a:fld>
             <a:endParaRPr lang="en-US"/>
           </a:p>
@@ -1969,7 +2077,7 @@
           <a:p>
             <a:fld id="{12110144-19AD-4D4E-902D-E18AF93089D3}" type="datetimeFigureOut">
               <a:rPr lang="en-US" smtClean="0"/>
-              <a:t>7/12/16</a:t>
+              <a:t>7/17/17</a:t>
             </a:fld>
             <a:endParaRPr lang="en-US"/>
           </a:p>
@@ -2139,7 +2247,7 @@
           <a:p>
             <a:fld id="{12110144-19AD-4D4E-902D-E18AF93089D3}" type="datetimeFigureOut">
               <a:rPr lang="en-US" smtClean="0"/>
-              <a:t>7/12/16</a:t>
+              <a:t>7/17/17</a:t>
             </a:fld>
             <a:endParaRPr lang="en-US"/>
           </a:p>
@@ -2385,7 +2493,7 @@
           <a:p>
             <a:fld id="{12110144-19AD-4D4E-902D-E18AF93089D3}" type="datetimeFigureOut">
               <a:rPr lang="en-US" smtClean="0"/>
-              <a:t>7/12/16</a:t>
+              <a:t>7/17/17</a:t>
             </a:fld>
             <a:endParaRPr lang="en-US"/>
           </a:p>
@@ -2673,7 +2781,7 @@
           <a:p>
             <a:fld id="{12110144-19AD-4D4E-902D-E18AF93089D3}" type="datetimeFigureOut">
               <a:rPr lang="en-US" smtClean="0"/>
-              <a:t>7/12/16</a:t>
+              <a:t>7/17/17</a:t>
             </a:fld>
             <a:endParaRPr lang="en-US"/>
           </a:p>
@@ -3095,7 +3203,7 @@
           <a:p>
             <a:fld id="{12110144-19AD-4D4E-902D-E18AF93089D3}" type="datetimeFigureOut">
               <a:rPr lang="en-US" smtClean="0"/>
-              <a:t>7/12/16</a:t>
+              <a:t>7/17/17</a:t>
             </a:fld>
             <a:endParaRPr lang="en-US"/>
           </a:p>
@@ -3213,7 +3321,7 @@
           <a:p>
             <a:fld id="{12110144-19AD-4D4E-902D-E18AF93089D3}" type="datetimeFigureOut">
               <a:rPr lang="en-US" smtClean="0"/>
-              <a:t>7/12/16</a:t>
+              <a:t>7/17/17</a:t>
             </a:fld>
             <a:endParaRPr lang="en-US"/>
           </a:p>
@@ -3308,7 +3416,7 @@
           <a:p>
             <a:fld id="{12110144-19AD-4D4E-902D-E18AF93089D3}" type="datetimeFigureOut">
               <a:rPr lang="en-US" smtClean="0"/>
-              <a:t>7/12/16</a:t>
+              <a:t>7/17/17</a:t>
             </a:fld>
             <a:endParaRPr lang="en-US"/>
           </a:p>
@@ -3585,7 +3693,7 @@
           <a:p>
             <a:fld id="{12110144-19AD-4D4E-902D-E18AF93089D3}" type="datetimeFigureOut">
               <a:rPr lang="en-US" smtClean="0"/>
-              <a:t>7/12/16</a:t>
+              <a:t>7/17/17</a:t>
             </a:fld>
             <a:endParaRPr lang="en-US"/>
           </a:p>
@@ -3838,7 +3946,7 @@
           <a:p>
             <a:fld id="{12110144-19AD-4D4E-902D-E18AF93089D3}" type="datetimeFigureOut">
               <a:rPr lang="en-US" smtClean="0"/>
-              <a:t>7/12/16</a:t>
+              <a:t>7/17/17</a:t>
             </a:fld>
             <a:endParaRPr lang="en-US"/>
           </a:p>
@@ -4069,7 +4177,7 @@
           <a:p>
             <a:fld id="{12110144-19AD-4D4E-902D-E18AF93089D3}" type="datetimeFigureOut">
               <a:rPr lang="en-US" smtClean="0"/>
-              <a:t>7/12/16</a:t>
+              <a:t>7/17/17</a:t>
             </a:fld>
             <a:endParaRPr lang="en-US"/>
           </a:p>
@@ -4548,7 +4656,7 @@
   <p:timing>
     <p:tnLst>
       <p:par>
-        <p:cTn xmlns:p14="http://schemas.microsoft.com/office/powerpoint/2010/main" id="1" dur="indefinite" restart="never" nodeType="tmRoot"/>
+        <p:cTn id="1" dur="indefinite" restart="never" nodeType="tmRoot"/>
       </p:par>
     </p:tnLst>
   </p:timing>
@@ -4584,193 +4692,96 @@
         </p:nvSpPr>
         <p:spPr/>
         <p:txBody>
-          <a:bodyPr/>
-          <a:lstStyle/>
-          <a:p>
-            <a:r>
-              <a:rPr lang="en-US" dirty="0" smtClean="0"/>
-              <a:t>Skeleton SOAP Message</a:t>
-            </a:r>
-            <a:endParaRPr lang="en-US" dirty="0"/>
-          </a:p>
-        </p:txBody>
-      </p:sp>
-      <p:sp>
-        <p:nvSpPr>
-          <p:cNvPr id="3" name="Content Placeholder 2"/>
-          <p:cNvSpPr>
-            <a:spLocks noGrp="1"/>
-          </p:cNvSpPr>
-          <p:nvPr>
-            <p:ph idx="1"/>
-          </p:nvPr>
-        </p:nvSpPr>
-        <p:spPr/>
-        <p:txBody>
           <a:bodyPr>
-            <a:normAutofit fontScale="62500" lnSpcReduction="20000"/>
+            <a:normAutofit/>
           </a:bodyPr>
           <a:lstStyle/>
           <a:p>
-            <a:pPr marL="0" indent="0">
+            <a:r>
+              <a:rPr lang="en-US" dirty="0" smtClean="0"/>
+              <a:t>WSDL</a:t>
+            </a:r>
+            <a:endParaRPr lang="en-US" dirty="0"/>
+          </a:p>
+        </p:txBody>
+      </p:sp>
+      <p:sp>
+        <p:nvSpPr>
+          <p:cNvPr id="3" name="Content Placeholder 2"/>
+          <p:cNvSpPr>
+            <a:spLocks noGrp="1"/>
+          </p:cNvSpPr>
+          <p:nvPr>
+            <p:ph idx="1"/>
+          </p:nvPr>
+        </p:nvSpPr>
+        <p:spPr/>
+        <p:txBody>
+          <a:bodyPr>
+            <a:normAutofit/>
+          </a:bodyPr>
+          <a:lstStyle/>
+          <a:p>
+            <a:r>
+              <a:rPr lang="en-US" dirty="0"/>
+              <a:t>Web Services Description Layer</a:t>
+            </a:r>
+          </a:p>
+          <a:p>
+            <a:r>
+              <a:rPr lang="en-US" dirty="0"/>
+              <a:t>An XML document that describes a web service</a:t>
+            </a:r>
+          </a:p>
+          <a:p>
+            <a:r>
+              <a:rPr lang="en-US" dirty="0"/>
+              <a:t>The main elements in a WSDL document:</a:t>
+            </a:r>
+          </a:p>
+          <a:p>
+            <a:pPr marL="457200" lvl="1" indent="0">
               <a:buNone/>
             </a:pPr>
-            <a:endParaRPr lang="en-US" sz="1400" dirty="0"/>
-          </a:p>
-          <a:p>
-            <a:pPr marL="400050" lvl="1" indent="0">
+            <a:r>
+              <a:rPr lang="en-US" dirty="0"/>
+              <a:t>&lt;types&gt; 		Contains data type definitions</a:t>
+            </a:r>
+          </a:p>
+          <a:p>
+            <a:pPr marL="457200" lvl="1" indent="0">
               <a:buNone/>
             </a:pPr>
             <a:r>
               <a:rPr lang="en-US" dirty="0"/>
-              <a:t>&lt;?xml version="1.0"?&gt;</a:t>
-            </a:r>
-          </a:p>
-          <a:p>
-            <a:pPr marL="400050" lvl="1" indent="0">
+              <a:t>&lt;message&gt;	Definition of the data being sent</a:t>
+            </a:r>
+          </a:p>
+          <a:p>
+            <a:pPr marL="457200" lvl="1" indent="0">
               <a:buNone/>
             </a:pPr>
             <a:r>
-              <a:rPr lang="ro-RO" dirty="0"/>
-              <a:t>&lt;soap:Envelope</a:t>
-            </a:r>
-          </a:p>
-          <a:p>
-            <a:pPr marL="400050" lvl="1" indent="0">
+              <a:rPr lang="en-US" dirty="0"/>
+              <a:t>&lt;</a:t>
+            </a:r>
+            <a:r>
+              <a:rPr lang="en-US" dirty="0" err="1"/>
+              <a:t>portType</a:t>
+            </a:r>
+            <a:r>
+              <a:rPr lang="en-US" dirty="0"/>
+              <a:t>&gt;	List of operations </a:t>
+            </a:r>
+          </a:p>
+          <a:p>
+            <a:pPr marL="457200" lvl="1" indent="0">
               <a:buNone/>
             </a:pPr>
             <a:r>
-              <a:rPr lang="ro-RO" dirty="0"/>
-              <a:t>xmlns:soap="http://www.w3.org/2001/12/soap-envelope"</a:t>
-            </a:r>
-          </a:p>
-          <a:p>
-            <a:pPr marL="400050" lvl="1" indent="0">
-              <a:buNone/>
-            </a:pPr>
-            <a:r>
-              <a:rPr lang="ro-RO" dirty="0"/>
-              <a:t>soap:encodingStyle="http://www.w3.org/2001/12/soap-encoding"&gt;</a:t>
-            </a:r>
-          </a:p>
-          <a:p>
-            <a:pPr marL="400050" lvl="1" indent="0">
-              <a:buNone/>
-            </a:pPr>
-            <a:endParaRPr lang="en-US" sz="1100" dirty="0"/>
-          </a:p>
-          <a:p>
-            <a:pPr marL="400050" lvl="1" indent="0">
-              <a:buNone/>
-            </a:pPr>
-            <a:r>
-              <a:rPr lang="ro-RO" dirty="0"/>
-              <a:t>&lt;soap:Header&gt;</a:t>
-            </a:r>
-          </a:p>
-          <a:p>
-            <a:pPr marL="400050" lvl="1" indent="0">
-              <a:buNone/>
-            </a:pPr>
-            <a:r>
-              <a:rPr lang="en-US" sz="2200" dirty="0"/>
-              <a:t>...</a:t>
-            </a:r>
-          </a:p>
-          <a:p>
-            <a:pPr marL="400050" lvl="1" indent="0">
-              <a:buNone/>
-            </a:pPr>
-            <a:r>
-              <a:rPr lang="ro-RO" dirty="0"/>
-              <a:t>&lt;/soap:Header&gt;</a:t>
-            </a:r>
-          </a:p>
-          <a:p>
-            <a:pPr marL="400050" lvl="1" indent="0">
-              <a:buNone/>
-            </a:pPr>
-            <a:endParaRPr lang="en-US" sz="1600" dirty="0"/>
-          </a:p>
-          <a:p>
-            <a:pPr marL="400050" lvl="1" indent="0">
-              <a:buNone/>
-            </a:pPr>
-            <a:r>
-              <a:rPr lang="ro-RO" dirty="0"/>
-              <a:t>&lt;soap:Body&gt;</a:t>
-            </a:r>
-          </a:p>
-          <a:p>
-            <a:pPr marL="400050" lvl="1" indent="0">
-              <a:buNone/>
-            </a:pPr>
-            <a:r>
-              <a:rPr lang="en-US" sz="2200" dirty="0"/>
-              <a:t>...</a:t>
-            </a:r>
-          </a:p>
-          <a:p>
-            <a:pPr marL="400050" lvl="1" indent="0">
-              <a:buNone/>
-            </a:pPr>
-            <a:r>
-              <a:rPr lang="ro-RO" dirty="0"/>
-              <a:t>  &lt;soap:Fault&gt;</a:t>
-            </a:r>
-          </a:p>
-          <a:p>
-            <a:pPr marL="400050" lvl="1" indent="0">
-              <a:buNone/>
-            </a:pPr>
-            <a:r>
-              <a:rPr lang="en-US" sz="2200" dirty="0"/>
-              <a:t>  ...</a:t>
-            </a:r>
-          </a:p>
-          <a:p>
-            <a:pPr marL="400050" lvl="1" indent="0">
-              <a:buNone/>
-            </a:pPr>
-            <a:r>
-              <a:rPr lang="ro-RO" dirty="0"/>
-              <a:t>  &lt;/soap:Fault&gt;</a:t>
-            </a:r>
-          </a:p>
-          <a:p>
-            <a:pPr marL="400050" lvl="1" indent="0">
-              <a:buNone/>
-            </a:pPr>
-            <a:r>
-              <a:rPr lang="ro-RO" dirty="0"/>
-              <a:t>&lt;/soap:Body&gt;</a:t>
-            </a:r>
-            <a:endParaRPr lang="en-US" dirty="0"/>
-          </a:p>
-          <a:p>
-            <a:pPr marL="400050" lvl="1" indent="0">
-              <a:buNone/>
-            </a:pPr>
-            <a:r>
-              <a:rPr lang="ro-RO" dirty="0"/>
-              <a:t>&lt;/soap:Envelope&gt;</a:t>
-            </a:r>
-          </a:p>
-          <a:p>
-            <a:pPr marL="400050" lvl="1" indent="0">
-              <a:buNone/>
-            </a:pPr>
-            <a:endParaRPr lang="ro-RO" sz="1300" dirty="0"/>
-          </a:p>
-          <a:p>
-            <a:pPr marL="400050" lvl="1" indent="0">
-              <a:buNone/>
-            </a:pPr>
-            <a:r>
-              <a:rPr lang="ro-RO" dirty="0"/>
-              <a:t>(From w3schools)</a:t>
-            </a:r>
-            <a:endParaRPr lang="en-US" dirty="0"/>
+              <a:rPr lang="en-US" dirty="0"/>
+              <a:t>&lt;binding&gt;	Protocol and data format for port type</a:t>
+            </a:r>
           </a:p>
           <a:p>
             <a:endParaRPr lang="en-US" dirty="0"/>
@@ -4780,7 +4791,7 @@
     </p:spTree>
     <p:extLst>
       <p:ext uri="{BB962C8B-B14F-4D97-AF65-F5344CB8AC3E}">
-        <p14:creationId xmlns:p14="http://schemas.microsoft.com/office/powerpoint/2010/main" val="1683562864"/>
+        <p14:creationId xmlns:p14="http://schemas.microsoft.com/office/powerpoint/2010/main" val="885899410"/>
       </p:ext>
     </p:extLst>
   </p:cSld>
@@ -4790,7 +4801,7 @@
   <p:timing>
     <p:tnLst>
       <p:par>
-        <p:cTn xmlns:p14="http://schemas.microsoft.com/office/powerpoint/2010/main" id="1" dur="indefinite" restart="never" nodeType="tmRoot"/>
+        <p:cTn id="1" dur="indefinite" restart="never" nodeType="tmRoot"/>
       </p:par>
     </p:tnLst>
   </p:timing>
@@ -4831,7 +4842,7 @@
           <a:p>
             <a:r>
               <a:rPr lang="en-US" dirty="0" smtClean="0"/>
-              <a:t>Request Body</a:t>
+              <a:t>SOAP Messages</a:t>
             </a:r>
             <a:endParaRPr lang="en-US" dirty="0"/>
           </a:p>
@@ -4855,116 +4866,56 @@
           <a:lstStyle/>
           <a:p>
             <a:r>
+              <a:rPr lang="en-US" dirty="0" smtClean="0"/>
+              <a:t>Used for Request and Response</a:t>
+            </a:r>
+            <a:endParaRPr lang="en-US" dirty="0"/>
+          </a:p>
+          <a:p>
+            <a:r>
               <a:rPr lang="en-US" dirty="0"/>
-              <a:t>Contains the actual SOAP message. </a:t>
-            </a:r>
-          </a:p>
-          <a:p>
+              <a:t>A SOAP message is an XML document (not a file) with these elements:</a:t>
+            </a:r>
+          </a:p>
+          <a:p>
+            <a:pPr lvl="1">
+              <a:buFont typeface="Courier New"/>
+              <a:buChar char="o"/>
+            </a:pPr>
             <a:r>
               <a:rPr lang="en-US" dirty="0"/>
-              <a:t>Example request message (w3schools),</a:t>
-            </a:r>
-            <a:br>
+              <a:t>Header</a:t>
+            </a:r>
+          </a:p>
+          <a:p>
+            <a:pPr lvl="1">
+              <a:buFont typeface="Courier New"/>
+              <a:buChar char="o"/>
+            </a:pPr>
+            <a:r>
               <a:rPr lang="en-US" dirty="0"/>
-            </a:br>
+              <a:t>Body</a:t>
+            </a:r>
+          </a:p>
+          <a:p>
+            <a:pPr lvl="1">
+              <a:buFont typeface="Courier New"/>
+              <a:buChar char="o"/>
+            </a:pPr>
             <a:r>
               <a:rPr lang="en-US" dirty="0"/>
-              <a:t>requests the price of apples</a:t>
-            </a:r>
-          </a:p>
-          <a:p>
-            <a:pPr marL="400050" lvl="1" indent="0">
-              <a:buNone/>
+              <a:t>Fault</a:t>
+            </a:r>
+          </a:p>
+          <a:p>
+            <a:pPr lvl="1">
+              <a:buFont typeface="Courier New"/>
+              <a:buChar char="o"/>
             </a:pPr>
             <a:r>
-              <a:rPr lang="ro-RO" sz="2400" dirty="0"/>
-              <a:t>&lt;soap:Body&gt;</a:t>
-            </a:r>
-          </a:p>
-          <a:p>
-            <a:pPr marL="800100" lvl="2" indent="0">
-              <a:buNone/>
-            </a:pPr>
-            <a:r>
-              <a:rPr lang="nl-NL" dirty="0"/>
-              <a:t>&lt;</a:t>
-            </a:r>
-            <a:r>
-              <a:rPr lang="nl-NL" dirty="0" err="1"/>
-              <a:t>m:GetPrice</a:t>
-            </a:r>
-            <a:r>
-              <a:rPr lang="nl-NL" dirty="0"/>
-              <a:t> </a:t>
-            </a:r>
-            <a:r>
-              <a:rPr lang="nl-NL" dirty="0" err="1"/>
-              <a:t>xmlns:m</a:t>
-            </a:r>
-            <a:r>
-              <a:rPr lang="nl-NL" dirty="0"/>
-              <a:t>="http://www.w3schools.com/</a:t>
-            </a:r>
-            <a:r>
-              <a:rPr lang="nl-NL" dirty="0" err="1"/>
-              <a:t>prices</a:t>
-            </a:r>
-            <a:r>
-              <a:rPr lang="nl-NL" dirty="0"/>
-              <a:t>"&gt;</a:t>
-            </a:r>
-          </a:p>
-          <a:p>
-            <a:pPr marL="1257300" lvl="3" indent="0">
-              <a:buNone/>
-            </a:pPr>
-            <a:r>
-              <a:rPr lang="en-US" sz="2400" dirty="0"/>
-              <a:t>&lt;</a:t>
-            </a:r>
-            <a:r>
-              <a:rPr lang="en-US" sz="2400" dirty="0" err="1"/>
-              <a:t>m:Item</a:t>
-            </a:r>
-            <a:r>
-              <a:rPr lang="en-US" sz="2400" dirty="0"/>
-              <a:t>&gt;Apples&lt;/</a:t>
-            </a:r>
-            <a:r>
-              <a:rPr lang="en-US" sz="2400" dirty="0" err="1"/>
-              <a:t>m:Item</a:t>
-            </a:r>
-            <a:r>
-              <a:rPr lang="en-US" sz="2400" dirty="0"/>
-              <a:t>&gt;</a:t>
-            </a:r>
-          </a:p>
-          <a:p>
-            <a:pPr marL="800100" lvl="2" indent="0">
-              <a:buNone/>
-            </a:pPr>
-            <a:r>
               <a:rPr lang="en-US" dirty="0"/>
-              <a:t>&lt;/</a:t>
-            </a:r>
-            <a:r>
-              <a:rPr lang="en-US" dirty="0" err="1"/>
-              <a:t>m:GetPrice</a:t>
-            </a:r>
-            <a:r>
-              <a:rPr lang="en-US" dirty="0"/>
-              <a:t>&gt;</a:t>
-            </a:r>
-          </a:p>
-          <a:p>
-            <a:pPr marL="400050" lvl="1" indent="0">
-              <a:buNone/>
-            </a:pPr>
-            <a:r>
-              <a:rPr lang="ro-RO" sz="2400" dirty="0"/>
-              <a:t>&lt;/soap:Body&gt;</a:t>
-            </a:r>
-            <a:endParaRPr lang="en-US" sz="2400" dirty="0"/>
+              <a:t>Envelope</a:t>
+            </a:r>
           </a:p>
           <a:p>
             <a:endParaRPr lang="en-US" dirty="0"/>
@@ -4974,7 +4925,7 @@
     </p:spTree>
     <p:extLst>
       <p:ext uri="{BB962C8B-B14F-4D97-AF65-F5344CB8AC3E}">
-        <p14:creationId xmlns:p14="http://schemas.microsoft.com/office/powerpoint/2010/main" val="3058979535"/>
+        <p14:creationId xmlns:p14="http://schemas.microsoft.com/office/powerpoint/2010/main" val="644461026"/>
       </p:ext>
     </p:extLst>
   </p:cSld>
@@ -4984,7 +4935,7 @@
   <p:timing>
     <p:tnLst>
       <p:par>
-        <p:cTn xmlns:p14="http://schemas.microsoft.com/office/powerpoint/2010/main" id="1" dur="indefinite" restart="never" nodeType="tmRoot"/>
+        <p:cTn id="1" dur="indefinite" restart="never" nodeType="tmRoot"/>
       </p:par>
     </p:tnLst>
   </p:timing>
@@ -5025,6 +4976,442 @@
           <a:p>
             <a:r>
               <a:rPr lang="en-US" dirty="0" smtClean="0"/>
+              <a:t>Skeleton SOAP Message</a:t>
+            </a:r>
+            <a:endParaRPr lang="en-US" dirty="0"/>
+          </a:p>
+        </p:txBody>
+      </p:sp>
+      <p:sp>
+        <p:nvSpPr>
+          <p:cNvPr id="3" name="Content Placeholder 2"/>
+          <p:cNvSpPr>
+            <a:spLocks noGrp="1"/>
+          </p:cNvSpPr>
+          <p:nvPr>
+            <p:ph idx="1"/>
+          </p:nvPr>
+        </p:nvSpPr>
+        <p:spPr/>
+        <p:txBody>
+          <a:bodyPr>
+            <a:normAutofit fontScale="62500" lnSpcReduction="20000"/>
+          </a:bodyPr>
+          <a:lstStyle/>
+          <a:p>
+            <a:pPr marL="0" indent="0">
+              <a:buNone/>
+            </a:pPr>
+            <a:endParaRPr lang="en-US" sz="1400" dirty="0"/>
+          </a:p>
+          <a:p>
+            <a:pPr marL="400050" lvl="1" indent="0">
+              <a:buNone/>
+            </a:pPr>
+            <a:r>
+              <a:rPr lang="en-US" dirty="0"/>
+              <a:t>&lt;?xml version="1.0"?&gt;</a:t>
+            </a:r>
+          </a:p>
+          <a:p>
+            <a:pPr marL="400050" lvl="1" indent="0">
+              <a:buNone/>
+            </a:pPr>
+            <a:r>
+              <a:rPr lang="ro-RO" dirty="0"/>
+              <a:t>&lt;soap:Envelope</a:t>
+            </a:r>
+          </a:p>
+          <a:p>
+            <a:pPr marL="400050" lvl="1" indent="0">
+              <a:buNone/>
+            </a:pPr>
+            <a:r>
+              <a:rPr lang="ro-RO" dirty="0"/>
+              <a:t>xmlns:soap="http://www.w3.org/2001/12/soap-envelope"</a:t>
+            </a:r>
+          </a:p>
+          <a:p>
+            <a:pPr marL="400050" lvl="1" indent="0">
+              <a:buNone/>
+            </a:pPr>
+            <a:r>
+              <a:rPr lang="ro-RO" dirty="0"/>
+              <a:t>soap:encodingStyle="http://www.w3.org/2001/12/soap-encoding"&gt;</a:t>
+            </a:r>
+          </a:p>
+          <a:p>
+            <a:pPr marL="400050" lvl="1" indent="0">
+              <a:buNone/>
+            </a:pPr>
+            <a:endParaRPr lang="en-US" sz="1100" dirty="0"/>
+          </a:p>
+          <a:p>
+            <a:pPr marL="400050" lvl="1" indent="0">
+              <a:buNone/>
+            </a:pPr>
+            <a:r>
+              <a:rPr lang="ro-RO" dirty="0"/>
+              <a:t>&lt;soap:Header&gt;</a:t>
+            </a:r>
+          </a:p>
+          <a:p>
+            <a:pPr marL="400050" lvl="1" indent="0">
+              <a:buNone/>
+            </a:pPr>
+            <a:r>
+              <a:rPr lang="en-US" sz="2200" dirty="0"/>
+              <a:t>...</a:t>
+            </a:r>
+          </a:p>
+          <a:p>
+            <a:pPr marL="400050" lvl="1" indent="0">
+              <a:buNone/>
+            </a:pPr>
+            <a:r>
+              <a:rPr lang="ro-RO" dirty="0"/>
+              <a:t>&lt;/soap:Header&gt;</a:t>
+            </a:r>
+          </a:p>
+          <a:p>
+            <a:pPr marL="400050" lvl="1" indent="0">
+              <a:buNone/>
+            </a:pPr>
+            <a:endParaRPr lang="en-US" sz="1600" dirty="0"/>
+          </a:p>
+          <a:p>
+            <a:pPr marL="400050" lvl="1" indent="0">
+              <a:buNone/>
+            </a:pPr>
+            <a:r>
+              <a:rPr lang="ro-RO" dirty="0"/>
+              <a:t>&lt;soap:Body&gt;</a:t>
+            </a:r>
+          </a:p>
+          <a:p>
+            <a:pPr marL="400050" lvl="1" indent="0">
+              <a:buNone/>
+            </a:pPr>
+            <a:r>
+              <a:rPr lang="en-US" sz="2200" dirty="0"/>
+              <a:t>...</a:t>
+            </a:r>
+          </a:p>
+          <a:p>
+            <a:pPr marL="400050" lvl="1" indent="0">
+              <a:buNone/>
+            </a:pPr>
+            <a:r>
+              <a:rPr lang="ro-RO" dirty="0"/>
+              <a:t>  &lt;soap:Fault&gt;</a:t>
+            </a:r>
+          </a:p>
+          <a:p>
+            <a:pPr marL="400050" lvl="1" indent="0">
+              <a:buNone/>
+            </a:pPr>
+            <a:r>
+              <a:rPr lang="en-US" sz="2200" dirty="0"/>
+              <a:t>  ...</a:t>
+            </a:r>
+          </a:p>
+          <a:p>
+            <a:pPr marL="400050" lvl="1" indent="0">
+              <a:buNone/>
+            </a:pPr>
+            <a:r>
+              <a:rPr lang="ro-RO" dirty="0"/>
+              <a:t>  &lt;/soap:Fault&gt;</a:t>
+            </a:r>
+          </a:p>
+          <a:p>
+            <a:pPr marL="400050" lvl="1" indent="0">
+              <a:buNone/>
+            </a:pPr>
+            <a:r>
+              <a:rPr lang="ro-RO" dirty="0"/>
+              <a:t>&lt;/soap:Body&gt;</a:t>
+            </a:r>
+            <a:endParaRPr lang="en-US" dirty="0"/>
+          </a:p>
+          <a:p>
+            <a:pPr marL="400050" lvl="1" indent="0">
+              <a:buNone/>
+            </a:pPr>
+            <a:r>
+              <a:rPr lang="ro-RO" dirty="0"/>
+              <a:t>&lt;/soap:Envelope&gt;</a:t>
+            </a:r>
+          </a:p>
+          <a:p>
+            <a:pPr marL="400050" lvl="1" indent="0">
+              <a:buNone/>
+            </a:pPr>
+            <a:endParaRPr lang="ro-RO" sz="1300" dirty="0"/>
+          </a:p>
+          <a:p>
+            <a:pPr marL="400050" lvl="1" indent="0">
+              <a:buNone/>
+            </a:pPr>
+            <a:r>
+              <a:rPr lang="ro-RO" dirty="0"/>
+              <a:t>(From w3schools)</a:t>
+            </a:r>
+            <a:endParaRPr lang="en-US" dirty="0"/>
+          </a:p>
+          <a:p>
+            <a:endParaRPr lang="en-US" dirty="0"/>
+          </a:p>
+        </p:txBody>
+      </p:sp>
+    </p:spTree>
+    <p:extLst>
+      <p:ext uri="{BB962C8B-B14F-4D97-AF65-F5344CB8AC3E}">
+        <p14:creationId xmlns:p14="http://schemas.microsoft.com/office/powerpoint/2010/main" val="1683562864"/>
+      </p:ext>
+    </p:extLst>
+  </p:cSld>
+  <p:clrMapOvr>
+    <a:masterClrMapping/>
+  </p:clrMapOvr>
+  <p:timing>
+    <p:tnLst>
+      <p:par>
+        <p:cTn id="1" dur="indefinite" restart="never" nodeType="tmRoot"/>
+      </p:par>
+    </p:tnLst>
+  </p:timing>
+</p:sld>
+</file>
+
+<file path=ppt/slides/slide13.xml><?xml version="1.0" encoding="utf-8"?>
+<p:sld xmlns:a="http://schemas.openxmlformats.org/drawingml/2006/main" xmlns:r="http://schemas.openxmlformats.org/officeDocument/2006/relationships" xmlns:p="http://schemas.openxmlformats.org/presentationml/2006/main">
+  <p:cSld>
+    <p:spTree>
+      <p:nvGrpSpPr>
+        <p:cNvPr id="1" name=""/>
+        <p:cNvGrpSpPr/>
+        <p:nvPr/>
+      </p:nvGrpSpPr>
+      <p:grpSpPr>
+        <a:xfrm>
+          <a:off x="0" y="0"/>
+          <a:ext cx="0" cy="0"/>
+          <a:chOff x="0" y="0"/>
+          <a:chExt cx="0" cy="0"/>
+        </a:xfrm>
+      </p:grpSpPr>
+      <p:sp>
+        <p:nvSpPr>
+          <p:cNvPr id="2" name="Title 1"/>
+          <p:cNvSpPr>
+            <a:spLocks noGrp="1"/>
+          </p:cNvSpPr>
+          <p:nvPr>
+            <p:ph type="title"/>
+          </p:nvPr>
+        </p:nvSpPr>
+        <p:spPr/>
+        <p:txBody>
+          <a:bodyPr/>
+          <a:lstStyle/>
+          <a:p>
+            <a:r>
+              <a:rPr lang="en-US" dirty="0" smtClean="0"/>
+              <a:t>Request Body</a:t>
+            </a:r>
+            <a:endParaRPr lang="en-US" dirty="0"/>
+          </a:p>
+        </p:txBody>
+      </p:sp>
+      <p:sp>
+        <p:nvSpPr>
+          <p:cNvPr id="3" name="Content Placeholder 2"/>
+          <p:cNvSpPr>
+            <a:spLocks noGrp="1"/>
+          </p:cNvSpPr>
+          <p:nvPr>
+            <p:ph idx="1"/>
+          </p:nvPr>
+        </p:nvSpPr>
+        <p:spPr/>
+        <p:txBody>
+          <a:bodyPr>
+            <a:normAutofit/>
+          </a:bodyPr>
+          <a:lstStyle/>
+          <a:p>
+            <a:r>
+              <a:rPr lang="en-US" dirty="0"/>
+              <a:t>Contains the actual SOAP message. </a:t>
+            </a:r>
+          </a:p>
+          <a:p>
+            <a:r>
+              <a:rPr lang="en-US" dirty="0"/>
+              <a:t>Example request message (w3schools),</a:t>
+            </a:r>
+            <a:br>
+              <a:rPr lang="en-US" dirty="0"/>
+            </a:br>
+            <a:r>
+              <a:rPr lang="en-US" dirty="0"/>
+              <a:t>requests the price of apples</a:t>
+            </a:r>
+          </a:p>
+          <a:p>
+            <a:pPr marL="400050" lvl="1" indent="0">
+              <a:buNone/>
+            </a:pPr>
+            <a:r>
+              <a:rPr lang="ro-RO" sz="2400" dirty="0"/>
+              <a:t>&lt;soap:Body&gt;</a:t>
+            </a:r>
+          </a:p>
+          <a:p>
+            <a:pPr marL="800100" lvl="2" indent="0">
+              <a:buNone/>
+            </a:pPr>
+            <a:r>
+              <a:rPr lang="nl-NL" dirty="0"/>
+              <a:t>&lt;</a:t>
+            </a:r>
+            <a:r>
+              <a:rPr lang="nl-NL" dirty="0" err="1"/>
+              <a:t>m:GetPrice</a:t>
+            </a:r>
+            <a:r>
+              <a:rPr lang="nl-NL" dirty="0"/>
+              <a:t> </a:t>
+            </a:r>
+            <a:r>
+              <a:rPr lang="nl-NL" dirty="0" err="1"/>
+              <a:t>xmlns:m</a:t>
+            </a:r>
+            <a:r>
+              <a:rPr lang="nl-NL" dirty="0"/>
+              <a:t>="http://www.w3schools.com/</a:t>
+            </a:r>
+            <a:r>
+              <a:rPr lang="nl-NL" dirty="0" err="1"/>
+              <a:t>prices</a:t>
+            </a:r>
+            <a:r>
+              <a:rPr lang="nl-NL" dirty="0"/>
+              <a:t>"&gt;</a:t>
+            </a:r>
+          </a:p>
+          <a:p>
+            <a:pPr marL="1257300" lvl="3" indent="0">
+              <a:buNone/>
+            </a:pPr>
+            <a:r>
+              <a:rPr lang="en-US" sz="2400" dirty="0"/>
+              <a:t>&lt;</a:t>
+            </a:r>
+            <a:r>
+              <a:rPr lang="en-US" sz="2400" dirty="0" err="1"/>
+              <a:t>m:Item</a:t>
+            </a:r>
+            <a:r>
+              <a:rPr lang="en-US" sz="2400" dirty="0"/>
+              <a:t>&gt;Apples&lt;/</a:t>
+            </a:r>
+            <a:r>
+              <a:rPr lang="en-US" sz="2400" dirty="0" err="1"/>
+              <a:t>m:Item</a:t>
+            </a:r>
+            <a:r>
+              <a:rPr lang="en-US" sz="2400" dirty="0"/>
+              <a:t>&gt;</a:t>
+            </a:r>
+          </a:p>
+          <a:p>
+            <a:pPr marL="800100" lvl="2" indent="0">
+              <a:buNone/>
+            </a:pPr>
+            <a:r>
+              <a:rPr lang="en-US" dirty="0"/>
+              <a:t>&lt;/</a:t>
+            </a:r>
+            <a:r>
+              <a:rPr lang="en-US" dirty="0" err="1"/>
+              <a:t>m:GetPrice</a:t>
+            </a:r>
+            <a:r>
+              <a:rPr lang="en-US" dirty="0"/>
+              <a:t>&gt;</a:t>
+            </a:r>
+          </a:p>
+          <a:p>
+            <a:pPr marL="400050" lvl="1" indent="0">
+              <a:buNone/>
+            </a:pPr>
+            <a:r>
+              <a:rPr lang="ro-RO" sz="2400" dirty="0"/>
+              <a:t>&lt;/soap:Body&gt;</a:t>
+            </a:r>
+            <a:endParaRPr lang="en-US" sz="2400" dirty="0"/>
+          </a:p>
+          <a:p>
+            <a:endParaRPr lang="en-US" dirty="0"/>
+          </a:p>
+        </p:txBody>
+      </p:sp>
+    </p:spTree>
+    <p:extLst>
+      <p:ext uri="{BB962C8B-B14F-4D97-AF65-F5344CB8AC3E}">
+        <p14:creationId xmlns:p14="http://schemas.microsoft.com/office/powerpoint/2010/main" val="3058979535"/>
+      </p:ext>
+    </p:extLst>
+  </p:cSld>
+  <p:clrMapOvr>
+    <a:masterClrMapping/>
+  </p:clrMapOvr>
+  <p:timing>
+    <p:tnLst>
+      <p:par>
+        <p:cTn id="1" dur="indefinite" restart="never" nodeType="tmRoot"/>
+      </p:par>
+    </p:tnLst>
+  </p:timing>
+</p:sld>
+</file>
+
+<file path=ppt/slides/slide14.xml><?xml version="1.0" encoding="utf-8"?>
+<p:sld xmlns:a="http://schemas.openxmlformats.org/drawingml/2006/main" xmlns:r="http://schemas.openxmlformats.org/officeDocument/2006/relationships" xmlns:p="http://schemas.openxmlformats.org/presentationml/2006/main">
+  <p:cSld>
+    <p:spTree>
+      <p:nvGrpSpPr>
+        <p:cNvPr id="1" name=""/>
+        <p:cNvGrpSpPr/>
+        <p:nvPr/>
+      </p:nvGrpSpPr>
+      <p:grpSpPr>
+        <a:xfrm>
+          <a:off x="0" y="0"/>
+          <a:ext cx="0" cy="0"/>
+          <a:chOff x="0" y="0"/>
+          <a:chExt cx="0" cy="0"/>
+        </a:xfrm>
+      </p:grpSpPr>
+      <p:sp>
+        <p:nvSpPr>
+          <p:cNvPr id="2" name="Title 1"/>
+          <p:cNvSpPr>
+            <a:spLocks noGrp="1"/>
+          </p:cNvSpPr>
+          <p:nvPr>
+            <p:ph type="title"/>
+          </p:nvPr>
+        </p:nvSpPr>
+        <p:spPr/>
+        <p:txBody>
+          <a:bodyPr/>
+          <a:lstStyle/>
+          <a:p>
+            <a:r>
+              <a:rPr lang="en-US" dirty="0" smtClean="0"/>
               <a:t>Response Body</a:t>
             </a:r>
             <a:endParaRPr lang="en-US" dirty="0"/>
@@ -5164,14 +5551,14 @@
   <p:timing>
     <p:tnLst>
       <p:par>
-        <p:cTn xmlns:p14="http://schemas.microsoft.com/office/powerpoint/2010/main" id="1" dur="indefinite" restart="never" nodeType="tmRoot"/>
+        <p:cTn id="1" dur="indefinite" restart="never" nodeType="tmRoot"/>
       </p:par>
     </p:tnLst>
   </p:timing>
 </p:sld>
 </file>
 
-<file path=ppt/slides/slide13.xml><?xml version="1.0" encoding="utf-8"?>
+<file path=ppt/slides/slide15.xml><?xml version="1.0" encoding="utf-8"?>
 <p:sld xmlns:a="http://schemas.openxmlformats.org/drawingml/2006/main" xmlns:r="http://schemas.openxmlformats.org/officeDocument/2006/relationships" xmlns:p="http://schemas.openxmlformats.org/presentationml/2006/main">
   <p:cSld>
     <p:spTree>
@@ -5635,14 +6022,14 @@
   <p:timing>
     <p:tnLst>
       <p:par>
-        <p:cTn xmlns:p14="http://schemas.microsoft.com/office/powerpoint/2010/main" id="1" dur="indefinite" restart="never" nodeType="tmRoot"/>
+        <p:cTn id="1" dur="indefinite" restart="never" nodeType="tmRoot"/>
       </p:par>
     </p:tnLst>
   </p:timing>
 </p:sld>
 </file>
 
-<file path=ppt/slides/slide14.xml><?xml version="1.0" encoding="utf-8"?>
+<file path=ppt/slides/slide16.xml><?xml version="1.0" encoding="utf-8"?>
 <p:sld xmlns:a="http://schemas.openxmlformats.org/drawingml/2006/main" xmlns:r="http://schemas.openxmlformats.org/officeDocument/2006/relationships" xmlns:p="http://schemas.openxmlformats.org/presentationml/2006/main">
   <p:cSld>
     <p:bg>
@@ -5766,7 +6153,7 @@
     </p:spTree>
     <p:extLst>
       <p:ext uri="{BB962C8B-B14F-4D97-AF65-F5344CB8AC3E}">
-        <p14:creationId xmlns:p14="http://schemas.microsoft.com/office/powerpoint/2010/main" val="3792523372"/>
+        <p14:creationId xmlns:p14="http://schemas.microsoft.com/office/powerpoint/2010/main" val="351502977"/>
       </p:ext>
     </p:extLst>
   </p:cSld>
@@ -5776,14 +6163,14 @@
   <p:timing>
     <p:tnLst>
       <p:par>
-        <p:cTn xmlns:p14="http://schemas.microsoft.com/office/powerpoint/2010/main" id="1" dur="indefinite" restart="never" nodeType="tmRoot"/>
+        <p:cTn id="1" dur="indefinite" restart="never" nodeType="tmRoot"/>
       </p:par>
     </p:tnLst>
   </p:timing>
 </p:sld>
 </file>
 
-<file path=ppt/slides/slide15.xml><?xml version="1.0" encoding="utf-8"?>
+<file path=ppt/slides/slide17.xml><?xml version="1.0" encoding="utf-8"?>
 <p:sld xmlns:a="http://schemas.openxmlformats.org/drawingml/2006/main" xmlns:r="http://schemas.openxmlformats.org/officeDocument/2006/relationships" xmlns:p="http://schemas.openxmlformats.org/presentationml/2006/main">
   <p:cSld>
     <p:bg>
@@ -6142,14 +6529,14 @@
   <p:timing>
     <p:tnLst>
       <p:par>
-        <p:cTn xmlns:p14="http://schemas.microsoft.com/office/powerpoint/2010/main" id="1" dur="indefinite" restart="never" nodeType="tmRoot"/>
+        <p:cTn id="1" dur="indefinite" restart="never" nodeType="tmRoot"/>
       </p:par>
     </p:tnLst>
   </p:timing>
 </p:sld>
 </file>
 
-<file path=ppt/slides/slide16.xml><?xml version="1.0" encoding="utf-8"?>
+<file path=ppt/slides/slide18.xml><?xml version="1.0" encoding="utf-8"?>
 <p:sld xmlns:a="http://schemas.openxmlformats.org/drawingml/2006/main" xmlns:r="http://schemas.openxmlformats.org/officeDocument/2006/relationships" xmlns:p="http://schemas.openxmlformats.org/presentationml/2006/main">
   <p:cSld>
     <p:bg>
@@ -6692,14 +7079,14 @@
   <p:timing>
     <p:tnLst>
       <p:par>
-        <p:cTn xmlns:p14="http://schemas.microsoft.com/office/powerpoint/2010/main" id="1" dur="indefinite" restart="never" nodeType="tmRoot"/>
+        <p:cTn id="1" dur="indefinite" restart="never" nodeType="tmRoot"/>
       </p:par>
     </p:tnLst>
   </p:timing>
 </p:sld>
 </file>
 
-<file path=ppt/slides/slide17.xml><?xml version="1.0" encoding="utf-8"?>
+<file path=ppt/slides/slide19.xml><?xml version="1.0" encoding="utf-8"?>
 <p:sld xmlns:a="http://schemas.openxmlformats.org/drawingml/2006/main" xmlns:r="http://schemas.openxmlformats.org/officeDocument/2006/relationships" xmlns:p="http://schemas.openxmlformats.org/presentationml/2006/main">
   <p:cSld>
     <p:bg>
@@ -7056,766 +7443,7 @@
   <p:timing>
     <p:tnLst>
       <p:par>
-        <p:cTn xmlns:p14="http://schemas.microsoft.com/office/powerpoint/2010/main" id="1" dur="indefinite" restart="never" nodeType="tmRoot"/>
-      </p:par>
-    </p:tnLst>
-  </p:timing>
-</p:sld>
-</file>
-
-<file path=ppt/slides/slide18.xml><?xml version="1.0" encoding="utf-8"?>
-<p:sld xmlns:a="http://schemas.openxmlformats.org/drawingml/2006/main" xmlns:r="http://schemas.openxmlformats.org/officeDocument/2006/relationships" xmlns:p="http://schemas.openxmlformats.org/presentationml/2006/main">
-  <p:cSld>
-    <p:bg>
-      <p:bgPr>
-        <a:gradFill flip="none" rotWithShape="1">
-          <a:gsLst>
-            <a:gs pos="100000">
-              <a:schemeClr val="bg2">
-                <a:lumMod val="25000"/>
-                <a:alpha val="68000"/>
-              </a:schemeClr>
-            </a:gs>
-            <a:gs pos="55000">
-              <a:schemeClr val="bg2">
-                <a:lumMod val="50000"/>
-                <a:alpha val="30000"/>
-              </a:schemeClr>
-            </a:gs>
-          </a:gsLst>
-          <a:lin ang="5400000" scaled="0"/>
-          <a:tileRect/>
-        </a:gradFill>
-        <a:effectLst/>
-      </p:bgPr>
-    </p:bg>
-    <p:spTree>
-      <p:nvGrpSpPr>
-        <p:cNvPr id="1" name=""/>
-        <p:cNvGrpSpPr/>
-        <p:nvPr/>
-      </p:nvGrpSpPr>
-      <p:grpSpPr>
-        <a:xfrm>
-          <a:off x="0" y="0"/>
-          <a:ext cx="0" cy="0"/>
-          <a:chOff x="0" y="0"/>
-          <a:chExt cx="0" cy="0"/>
-        </a:xfrm>
-      </p:grpSpPr>
-      <p:sp>
-        <p:nvSpPr>
-          <p:cNvPr id="4" name="Title 1"/>
-          <p:cNvSpPr txBox="1">
-            <a:spLocks/>
-          </p:cNvSpPr>
-          <p:nvPr/>
-        </p:nvSpPr>
-        <p:spPr>
-          <a:xfrm>
-            <a:off x="457200" y="274638"/>
-            <a:ext cx="8229600" cy="1143000"/>
-          </a:xfrm>
-          <a:prstGeom prst="rect">
-            <a:avLst/>
-          </a:prstGeom>
-        </p:spPr>
-        <p:txBody>
-          <a:bodyPr>
-            <a:normAutofit fontScale="90000"/>
-          </a:bodyPr>
-          <a:lstStyle>
-            <a:lvl1pPr algn="ctr" defTabSz="457200" rtl="0" eaLnBrk="1" latinLnBrk="0" hangingPunct="1">
-              <a:spcBef>
-                <a:spcPct val="0"/>
-              </a:spcBef>
-              <a:buNone/>
-              <a:defRPr sz="4400" kern="1200">
-                <a:solidFill>
-                  <a:schemeClr val="tx1"/>
-                </a:solidFill>
-                <a:latin typeface="+mj-lt"/>
-                <a:ea typeface="+mj-ea"/>
-                <a:cs typeface="+mj-cs"/>
-              </a:defRPr>
-            </a:lvl1pPr>
-          </a:lstStyle>
-          <a:p>
-            <a:r>
-              <a:rPr lang="en-US" smtClean="0">
-                <a:solidFill>
-                  <a:srgbClr val="0000FF"/>
-                </a:solidFill>
-              </a:rPr>
-              <a:t>Creating a SOAP Request (continued)</a:t>
-            </a:r>
-            <a:endParaRPr lang="en-US" dirty="0">
-              <a:solidFill>
-                <a:srgbClr val="0000FF"/>
-              </a:solidFill>
-            </a:endParaRPr>
-          </a:p>
-        </p:txBody>
-      </p:sp>
-      <p:sp>
-        <p:nvSpPr>
-          <p:cNvPr id="5" name="Content Placeholder 2"/>
-          <p:cNvSpPr txBox="1">
-            <a:spLocks/>
-          </p:cNvSpPr>
-          <p:nvPr/>
-        </p:nvSpPr>
-        <p:spPr>
-          <a:xfrm>
-            <a:off x="457200" y="1600200"/>
-            <a:ext cx="8229600" cy="4954002"/>
-          </a:xfrm>
-          <a:prstGeom prst="rect">
-            <a:avLst/>
-          </a:prstGeom>
-        </p:spPr>
-        <p:txBody>
-          <a:bodyPr>
-            <a:normAutofit lnSpcReduction="10000"/>
-          </a:bodyPr>
-          <a:lstStyle>
-            <a:lvl1pPr marL="342900" indent="-342900" algn="l" defTabSz="457200" rtl="0" eaLnBrk="1" latinLnBrk="0" hangingPunct="1">
-              <a:spcBef>
-                <a:spcPct val="20000"/>
-              </a:spcBef>
-              <a:buFont typeface="Arial"/>
-              <a:buChar char="•"/>
-              <a:defRPr sz="3200" kern="1200">
-                <a:solidFill>
-                  <a:schemeClr val="tx1"/>
-                </a:solidFill>
-                <a:latin typeface="+mn-lt"/>
-                <a:ea typeface="+mn-ea"/>
-                <a:cs typeface="+mn-cs"/>
-              </a:defRPr>
-            </a:lvl1pPr>
-            <a:lvl2pPr marL="742950" indent="-285750" algn="l" defTabSz="457200" rtl="0" eaLnBrk="1" latinLnBrk="0" hangingPunct="1">
-              <a:spcBef>
-                <a:spcPct val="20000"/>
-              </a:spcBef>
-              <a:buFont typeface="Arial"/>
-              <a:buChar char="–"/>
-              <a:defRPr sz="2800" kern="1200">
-                <a:solidFill>
-                  <a:schemeClr val="tx1"/>
-                </a:solidFill>
-                <a:latin typeface="+mn-lt"/>
-                <a:ea typeface="+mn-ea"/>
-                <a:cs typeface="+mn-cs"/>
-              </a:defRPr>
-            </a:lvl2pPr>
-            <a:lvl3pPr marL="1143000" indent="-228600" algn="l" defTabSz="457200" rtl="0" eaLnBrk="1" latinLnBrk="0" hangingPunct="1">
-              <a:spcBef>
-                <a:spcPct val="20000"/>
-              </a:spcBef>
-              <a:buFont typeface="Arial"/>
-              <a:buChar char="•"/>
-              <a:defRPr sz="2400" kern="1200">
-                <a:solidFill>
-                  <a:schemeClr val="tx1"/>
-                </a:solidFill>
-                <a:latin typeface="+mn-lt"/>
-                <a:ea typeface="+mn-ea"/>
-                <a:cs typeface="+mn-cs"/>
-              </a:defRPr>
-            </a:lvl3pPr>
-            <a:lvl4pPr marL="1600200" indent="-228600" algn="l" defTabSz="457200" rtl="0" eaLnBrk="1" latinLnBrk="0" hangingPunct="1">
-              <a:spcBef>
-                <a:spcPct val="20000"/>
-              </a:spcBef>
-              <a:buFont typeface="Arial"/>
-              <a:buChar char="–"/>
-              <a:defRPr sz="2000" kern="1200">
-                <a:solidFill>
-                  <a:schemeClr val="tx1"/>
-                </a:solidFill>
-                <a:latin typeface="+mn-lt"/>
-                <a:ea typeface="+mn-ea"/>
-                <a:cs typeface="+mn-cs"/>
-              </a:defRPr>
-            </a:lvl4pPr>
-            <a:lvl5pPr marL="2057400" indent="-228600" algn="l" defTabSz="457200" rtl="0" eaLnBrk="1" latinLnBrk="0" hangingPunct="1">
-              <a:spcBef>
-                <a:spcPct val="20000"/>
-              </a:spcBef>
-              <a:buFont typeface="Arial"/>
-              <a:buChar char="»"/>
-              <a:defRPr sz="2000" kern="1200">
-                <a:solidFill>
-                  <a:schemeClr val="tx1"/>
-                </a:solidFill>
-                <a:latin typeface="+mn-lt"/>
-                <a:ea typeface="+mn-ea"/>
-                <a:cs typeface="+mn-cs"/>
-              </a:defRPr>
-            </a:lvl5pPr>
-            <a:lvl6pPr marL="2514600" indent="-228600" algn="l" defTabSz="457200" rtl="0" eaLnBrk="1" latinLnBrk="0" hangingPunct="1">
-              <a:spcBef>
-                <a:spcPct val="20000"/>
-              </a:spcBef>
-              <a:buFont typeface="Arial"/>
-              <a:buChar char="•"/>
-              <a:defRPr sz="2000" kern="1200">
-                <a:solidFill>
-                  <a:schemeClr val="tx1"/>
-                </a:solidFill>
-                <a:latin typeface="+mn-lt"/>
-                <a:ea typeface="+mn-ea"/>
-                <a:cs typeface="+mn-cs"/>
-              </a:defRPr>
-            </a:lvl6pPr>
-            <a:lvl7pPr marL="2971800" indent="-228600" algn="l" defTabSz="457200" rtl="0" eaLnBrk="1" latinLnBrk="0" hangingPunct="1">
-              <a:spcBef>
-                <a:spcPct val="20000"/>
-              </a:spcBef>
-              <a:buFont typeface="Arial"/>
-              <a:buChar char="•"/>
-              <a:defRPr sz="2000" kern="1200">
-                <a:solidFill>
-                  <a:schemeClr val="tx1"/>
-                </a:solidFill>
-                <a:latin typeface="+mn-lt"/>
-                <a:ea typeface="+mn-ea"/>
-                <a:cs typeface="+mn-cs"/>
-              </a:defRPr>
-            </a:lvl7pPr>
-            <a:lvl8pPr marL="3429000" indent="-228600" algn="l" defTabSz="457200" rtl="0" eaLnBrk="1" latinLnBrk="0" hangingPunct="1">
-              <a:spcBef>
-                <a:spcPct val="20000"/>
-              </a:spcBef>
-              <a:buFont typeface="Arial"/>
-              <a:buChar char="•"/>
-              <a:defRPr sz="2000" kern="1200">
-                <a:solidFill>
-                  <a:schemeClr val="tx1"/>
-                </a:solidFill>
-                <a:latin typeface="+mn-lt"/>
-                <a:ea typeface="+mn-ea"/>
-                <a:cs typeface="+mn-cs"/>
-              </a:defRPr>
-            </a:lvl8pPr>
-            <a:lvl9pPr marL="3886200" indent="-228600" algn="l" defTabSz="457200" rtl="0" eaLnBrk="1" latinLnBrk="0" hangingPunct="1">
-              <a:spcBef>
-                <a:spcPct val="20000"/>
-              </a:spcBef>
-              <a:buFont typeface="Arial"/>
-              <a:buChar char="•"/>
-              <a:defRPr sz="2000" kern="1200">
-                <a:solidFill>
-                  <a:schemeClr val="tx1"/>
-                </a:solidFill>
-                <a:latin typeface="+mn-lt"/>
-                <a:ea typeface="+mn-ea"/>
-                <a:cs typeface="+mn-cs"/>
-              </a:defRPr>
-            </a:lvl9pPr>
-          </a:lstStyle>
-          <a:p>
-            <a:r>
-              <a:rPr lang="en-US" dirty="0" smtClean="0"/>
-              <a:t>Create an Envelope:</a:t>
-            </a:r>
-            <a:br>
-              <a:rPr lang="en-US" dirty="0" smtClean="0"/>
-            </a:br>
-            <a:r>
-              <a:rPr lang="en-US" sz="2400" i="1" dirty="0" err="1" smtClean="0"/>
-              <a:t>SoapSerializationEnvelope</a:t>
-            </a:r>
-            <a:r>
-              <a:rPr lang="en-US" sz="2400" i="1" dirty="0" smtClean="0"/>
-              <a:t> envelope = </a:t>
-            </a:r>
-            <a:br>
-              <a:rPr lang="en-US" sz="2400" i="1" dirty="0" smtClean="0"/>
-            </a:br>
-            <a:r>
-              <a:rPr lang="en-US" sz="2400" i="1" dirty="0" smtClean="0"/>
-              <a:t>            </a:t>
-            </a:r>
-            <a:r>
-              <a:rPr lang="en-US" sz="2400" b="1" i="1" dirty="0" smtClean="0"/>
-              <a:t>new </a:t>
-            </a:r>
-            <a:r>
-              <a:rPr lang="en-US" sz="2400" i="1" dirty="0" err="1" smtClean="0"/>
-              <a:t>SoapSerializationEnvelope</a:t>
-            </a:r>
-            <a:r>
-              <a:rPr lang="en-US" sz="2400" i="1" dirty="0" smtClean="0"/>
-              <a:t>(SoapEnvelope.</a:t>
-            </a:r>
-            <a:r>
-              <a:rPr lang="en-US" sz="2400" b="1" i="1" dirty="0" smtClean="0"/>
-              <a:t>VER12</a:t>
-            </a:r>
-            <a:r>
-              <a:rPr lang="en-US" sz="2400" i="1" dirty="0" smtClean="0"/>
-              <a:t>);</a:t>
-            </a:r>
-          </a:p>
-          <a:p>
-            <a:pPr lvl="1">
-              <a:buFont typeface="Courier New"/>
-              <a:buChar char="o"/>
-            </a:pPr>
-            <a:r>
-              <a:rPr lang="en-US" dirty="0" smtClean="0"/>
-              <a:t>Pass the SOAP version, 1.2, to the constructor</a:t>
-            </a:r>
-          </a:p>
-          <a:p>
-            <a:r>
-              <a:rPr lang="en-US" dirty="0" smtClean="0"/>
-              <a:t>Initialize the envelope:</a:t>
-            </a:r>
-          </a:p>
-          <a:p>
-            <a:pPr lvl="1">
-              <a:buFont typeface="Courier New"/>
-              <a:buChar char="o"/>
-            </a:pPr>
-            <a:r>
-              <a:rPr lang="en-US" dirty="0" err="1" smtClean="0"/>
-              <a:t>dotNet</a:t>
-            </a:r>
-            <a:r>
-              <a:rPr lang="en-US" dirty="0" smtClean="0"/>
-              <a:t> property: Set to true if the web service you are consuming is written using .NET:</a:t>
-            </a:r>
-            <a:r>
-              <a:rPr lang="en-US" i="1" dirty="0" smtClean="0"/>
-              <a:t/>
-            </a:r>
-            <a:br>
-              <a:rPr lang="en-US" i="1" dirty="0" smtClean="0"/>
-            </a:br>
-            <a:r>
-              <a:rPr lang="en-US" i="1" dirty="0" smtClean="0"/>
-              <a:t>     </a:t>
-            </a:r>
-            <a:r>
-              <a:rPr lang="en-US" sz="2400" i="1" dirty="0" err="1" smtClean="0"/>
-              <a:t>envelope.dotNet</a:t>
-            </a:r>
-            <a:r>
-              <a:rPr lang="en-US" sz="2400" i="1" dirty="0" smtClean="0"/>
-              <a:t> = true;</a:t>
-            </a:r>
-          </a:p>
-          <a:p>
-            <a:pPr lvl="1">
-              <a:buFont typeface="Courier New"/>
-              <a:buChar char="o"/>
-            </a:pPr>
-            <a:r>
-              <a:rPr lang="en-US" dirty="0" err="1" smtClean="0"/>
-              <a:t>setOutputSoapObject</a:t>
-            </a:r>
-            <a:r>
-              <a:rPr lang="en-US" dirty="0" smtClean="0"/>
-              <a:t>: pass in an instance of </a:t>
-            </a:r>
-            <a:r>
-              <a:rPr lang="en-US" dirty="0" err="1" smtClean="0"/>
-              <a:t>soapObject</a:t>
-            </a:r>
-            <a:r>
-              <a:rPr lang="en-US" i="1" dirty="0" smtClean="0"/>
-              <a:t/>
-            </a:r>
-            <a:br>
-              <a:rPr lang="en-US" i="1" dirty="0" smtClean="0"/>
-            </a:br>
-            <a:r>
-              <a:rPr lang="en-US" i="1" dirty="0" smtClean="0"/>
-              <a:t>     </a:t>
-            </a:r>
-            <a:r>
-              <a:rPr lang="en-US" sz="2400" i="1" dirty="0" err="1" smtClean="0"/>
-              <a:t>envelope.setOutputSoapObject</a:t>
-            </a:r>
-            <a:r>
-              <a:rPr lang="en-US" sz="2400" i="1" dirty="0" smtClean="0"/>
-              <a:t>(request);</a:t>
-            </a:r>
-            <a:endParaRPr lang="en-US" sz="2400" i="1" dirty="0"/>
-          </a:p>
-        </p:txBody>
-      </p:sp>
-    </p:spTree>
-    <p:extLst>
-      <p:ext uri="{BB962C8B-B14F-4D97-AF65-F5344CB8AC3E}">
-        <p14:creationId xmlns:p14="http://schemas.microsoft.com/office/powerpoint/2010/main" val="1643403760"/>
-      </p:ext>
-    </p:extLst>
-  </p:cSld>
-  <p:clrMapOvr>
-    <a:masterClrMapping/>
-  </p:clrMapOvr>
-  <p:timing>
-    <p:tnLst>
-      <p:par>
-        <p:cTn xmlns:p14="http://schemas.microsoft.com/office/powerpoint/2010/main" id="1" dur="indefinite" restart="never" nodeType="tmRoot"/>
-      </p:par>
-    </p:tnLst>
-  </p:timing>
-</p:sld>
-</file>
-
-<file path=ppt/slides/slide19.xml><?xml version="1.0" encoding="utf-8"?>
-<p:sld xmlns:a="http://schemas.openxmlformats.org/drawingml/2006/main" xmlns:r="http://schemas.openxmlformats.org/officeDocument/2006/relationships" xmlns:p="http://schemas.openxmlformats.org/presentationml/2006/main">
-  <p:cSld>
-    <p:bg>
-      <p:bgPr>
-        <a:gradFill flip="none" rotWithShape="1">
-          <a:gsLst>
-            <a:gs pos="100000">
-              <a:schemeClr val="bg2">
-                <a:lumMod val="25000"/>
-                <a:alpha val="68000"/>
-              </a:schemeClr>
-            </a:gs>
-            <a:gs pos="55000">
-              <a:schemeClr val="bg2">
-                <a:lumMod val="50000"/>
-                <a:alpha val="30000"/>
-              </a:schemeClr>
-            </a:gs>
-          </a:gsLst>
-          <a:lin ang="5400000" scaled="0"/>
-          <a:tileRect/>
-        </a:gradFill>
-        <a:effectLst/>
-      </p:bgPr>
-    </p:bg>
-    <p:spTree>
-      <p:nvGrpSpPr>
-        <p:cNvPr id="1" name=""/>
-        <p:cNvGrpSpPr/>
-        <p:nvPr/>
-      </p:nvGrpSpPr>
-      <p:grpSpPr>
-        <a:xfrm>
-          <a:off x="0" y="0"/>
-          <a:ext cx="0" cy="0"/>
-          <a:chOff x="0" y="0"/>
-          <a:chExt cx="0" cy="0"/>
-        </a:xfrm>
-      </p:grpSpPr>
-      <p:sp>
-        <p:nvSpPr>
-          <p:cNvPr id="2" name="Title 1"/>
-          <p:cNvSpPr txBox="1">
-            <a:spLocks/>
-          </p:cNvSpPr>
-          <p:nvPr/>
-        </p:nvSpPr>
-        <p:spPr>
-          <a:xfrm>
-            <a:off x="457200" y="274638"/>
-            <a:ext cx="8229600" cy="1143000"/>
-          </a:xfrm>
-          <a:prstGeom prst="rect">
-            <a:avLst/>
-          </a:prstGeom>
-        </p:spPr>
-        <p:txBody>
-          <a:bodyPr/>
-          <a:lstStyle>
-            <a:lvl1pPr algn="ctr" defTabSz="457200" rtl="0" eaLnBrk="1" latinLnBrk="0" hangingPunct="1">
-              <a:spcBef>
-                <a:spcPct val="0"/>
-              </a:spcBef>
-              <a:buNone/>
-              <a:defRPr sz="4400" kern="1200">
-                <a:solidFill>
-                  <a:schemeClr val="tx1"/>
-                </a:solidFill>
-                <a:latin typeface="+mj-lt"/>
-                <a:ea typeface="+mj-ea"/>
-                <a:cs typeface="+mj-cs"/>
-              </a:defRPr>
-            </a:lvl1pPr>
-          </a:lstStyle>
-          <a:p>
-            <a:r>
-              <a:rPr lang="en-US" smtClean="0">
-                <a:solidFill>
-                  <a:srgbClr val="0000FF"/>
-                </a:solidFill>
-              </a:rPr>
-              <a:t>Sending the SOAP Request</a:t>
-            </a:r>
-            <a:endParaRPr lang="en-US" dirty="0">
-              <a:solidFill>
-                <a:srgbClr val="0000FF"/>
-              </a:solidFill>
-            </a:endParaRPr>
-          </a:p>
-        </p:txBody>
-      </p:sp>
-      <p:sp>
-        <p:nvSpPr>
-          <p:cNvPr id="3" name="Content Placeholder 2"/>
-          <p:cNvSpPr txBox="1">
-            <a:spLocks/>
-          </p:cNvSpPr>
-          <p:nvPr/>
-        </p:nvSpPr>
-        <p:spPr>
-          <a:xfrm>
-            <a:off x="457200" y="1600200"/>
-            <a:ext cx="8229600" cy="4525963"/>
-          </a:xfrm>
-          <a:prstGeom prst="rect">
-            <a:avLst/>
-          </a:prstGeom>
-        </p:spPr>
-        <p:txBody>
-          <a:bodyPr>
-            <a:normAutofit/>
-          </a:bodyPr>
-          <a:lstStyle>
-            <a:lvl1pPr marL="342900" indent="-342900" algn="l" defTabSz="457200" rtl="0" eaLnBrk="1" latinLnBrk="0" hangingPunct="1">
-              <a:spcBef>
-                <a:spcPct val="20000"/>
-              </a:spcBef>
-              <a:buFont typeface="Arial"/>
-              <a:buChar char="•"/>
-              <a:defRPr sz="3200" kern="1200">
-                <a:solidFill>
-                  <a:schemeClr val="tx1"/>
-                </a:solidFill>
-                <a:latin typeface="+mn-lt"/>
-                <a:ea typeface="+mn-ea"/>
-                <a:cs typeface="+mn-cs"/>
-              </a:defRPr>
-            </a:lvl1pPr>
-            <a:lvl2pPr marL="742950" indent="-285750" algn="l" defTabSz="457200" rtl="0" eaLnBrk="1" latinLnBrk="0" hangingPunct="1">
-              <a:spcBef>
-                <a:spcPct val="20000"/>
-              </a:spcBef>
-              <a:buFont typeface="Arial"/>
-              <a:buChar char="–"/>
-              <a:defRPr sz="2800" kern="1200">
-                <a:solidFill>
-                  <a:schemeClr val="tx1"/>
-                </a:solidFill>
-                <a:latin typeface="+mn-lt"/>
-                <a:ea typeface="+mn-ea"/>
-                <a:cs typeface="+mn-cs"/>
-              </a:defRPr>
-            </a:lvl2pPr>
-            <a:lvl3pPr marL="1143000" indent="-228600" algn="l" defTabSz="457200" rtl="0" eaLnBrk="1" latinLnBrk="0" hangingPunct="1">
-              <a:spcBef>
-                <a:spcPct val="20000"/>
-              </a:spcBef>
-              <a:buFont typeface="Arial"/>
-              <a:buChar char="•"/>
-              <a:defRPr sz="2400" kern="1200">
-                <a:solidFill>
-                  <a:schemeClr val="tx1"/>
-                </a:solidFill>
-                <a:latin typeface="+mn-lt"/>
-                <a:ea typeface="+mn-ea"/>
-                <a:cs typeface="+mn-cs"/>
-              </a:defRPr>
-            </a:lvl3pPr>
-            <a:lvl4pPr marL="1600200" indent="-228600" algn="l" defTabSz="457200" rtl="0" eaLnBrk="1" latinLnBrk="0" hangingPunct="1">
-              <a:spcBef>
-                <a:spcPct val="20000"/>
-              </a:spcBef>
-              <a:buFont typeface="Arial"/>
-              <a:buChar char="–"/>
-              <a:defRPr sz="2000" kern="1200">
-                <a:solidFill>
-                  <a:schemeClr val="tx1"/>
-                </a:solidFill>
-                <a:latin typeface="+mn-lt"/>
-                <a:ea typeface="+mn-ea"/>
-                <a:cs typeface="+mn-cs"/>
-              </a:defRPr>
-            </a:lvl4pPr>
-            <a:lvl5pPr marL="2057400" indent="-228600" algn="l" defTabSz="457200" rtl="0" eaLnBrk="1" latinLnBrk="0" hangingPunct="1">
-              <a:spcBef>
-                <a:spcPct val="20000"/>
-              </a:spcBef>
-              <a:buFont typeface="Arial"/>
-              <a:buChar char="»"/>
-              <a:defRPr sz="2000" kern="1200">
-                <a:solidFill>
-                  <a:schemeClr val="tx1"/>
-                </a:solidFill>
-                <a:latin typeface="+mn-lt"/>
-                <a:ea typeface="+mn-ea"/>
-                <a:cs typeface="+mn-cs"/>
-              </a:defRPr>
-            </a:lvl5pPr>
-            <a:lvl6pPr marL="2514600" indent="-228600" algn="l" defTabSz="457200" rtl="0" eaLnBrk="1" latinLnBrk="0" hangingPunct="1">
-              <a:spcBef>
-                <a:spcPct val="20000"/>
-              </a:spcBef>
-              <a:buFont typeface="Arial"/>
-              <a:buChar char="•"/>
-              <a:defRPr sz="2000" kern="1200">
-                <a:solidFill>
-                  <a:schemeClr val="tx1"/>
-                </a:solidFill>
-                <a:latin typeface="+mn-lt"/>
-                <a:ea typeface="+mn-ea"/>
-                <a:cs typeface="+mn-cs"/>
-              </a:defRPr>
-            </a:lvl6pPr>
-            <a:lvl7pPr marL="2971800" indent="-228600" algn="l" defTabSz="457200" rtl="0" eaLnBrk="1" latinLnBrk="0" hangingPunct="1">
-              <a:spcBef>
-                <a:spcPct val="20000"/>
-              </a:spcBef>
-              <a:buFont typeface="Arial"/>
-              <a:buChar char="•"/>
-              <a:defRPr sz="2000" kern="1200">
-                <a:solidFill>
-                  <a:schemeClr val="tx1"/>
-                </a:solidFill>
-                <a:latin typeface="+mn-lt"/>
-                <a:ea typeface="+mn-ea"/>
-                <a:cs typeface="+mn-cs"/>
-              </a:defRPr>
-            </a:lvl7pPr>
-            <a:lvl8pPr marL="3429000" indent="-228600" algn="l" defTabSz="457200" rtl="0" eaLnBrk="1" latinLnBrk="0" hangingPunct="1">
-              <a:spcBef>
-                <a:spcPct val="20000"/>
-              </a:spcBef>
-              <a:buFont typeface="Arial"/>
-              <a:buChar char="•"/>
-              <a:defRPr sz="2000" kern="1200">
-                <a:solidFill>
-                  <a:schemeClr val="tx1"/>
-                </a:solidFill>
-                <a:latin typeface="+mn-lt"/>
-                <a:ea typeface="+mn-ea"/>
-                <a:cs typeface="+mn-cs"/>
-              </a:defRPr>
-            </a:lvl8pPr>
-            <a:lvl9pPr marL="3886200" indent="-228600" algn="l" defTabSz="457200" rtl="0" eaLnBrk="1" latinLnBrk="0" hangingPunct="1">
-              <a:spcBef>
-                <a:spcPct val="20000"/>
-              </a:spcBef>
-              <a:buFont typeface="Arial"/>
-              <a:buChar char="•"/>
-              <a:defRPr sz="2000" kern="1200">
-                <a:solidFill>
-                  <a:schemeClr val="tx1"/>
-                </a:solidFill>
-                <a:latin typeface="+mn-lt"/>
-                <a:ea typeface="+mn-ea"/>
-                <a:cs typeface="+mn-cs"/>
-              </a:defRPr>
-            </a:lvl9pPr>
-          </a:lstStyle>
-          <a:p>
-            <a:r>
-              <a:rPr lang="en-US" smtClean="0"/>
-              <a:t>Instantiate an instance of HttpTrasportSE</a:t>
-            </a:r>
-            <a:r>
-              <a:rPr lang="en-US" i="1" smtClean="0"/>
-              <a:t/>
-            </a:r>
-            <a:br>
-              <a:rPr lang="en-US" i="1" smtClean="0"/>
-            </a:br>
-            <a:r>
-              <a:rPr lang="en-US" sz="2400" i="1" smtClean="0"/>
-              <a:t>HttpTransportSE ht = new HttpTransportSE(</a:t>
-            </a:r>
-            <a:br>
-              <a:rPr lang="en-US" sz="2400" i="1" smtClean="0"/>
-            </a:br>
-            <a:r>
-              <a:rPr lang="en-US" sz="2400" i="1" smtClean="0"/>
-              <a:t> </a:t>
-            </a:r>
-            <a:r>
-              <a:rPr lang="en-US" sz="2000" i="1" smtClean="0"/>
-              <a:t>   Proxy.NO_PROXY,</a:t>
-            </a:r>
-            <a:r>
-              <a:rPr lang="en-US" sz="2400" i="1" smtClean="0"/>
-              <a:t/>
-            </a:r>
-            <a:br>
-              <a:rPr lang="en-US" sz="2400" i="1" smtClean="0"/>
-            </a:br>
-            <a:r>
-              <a:rPr lang="en-US" sz="2400" i="1" smtClean="0"/>
-              <a:t>    "http://wsf.cdyne.com/WeatherWS/ Weather.asmx",</a:t>
-            </a:r>
-            <a:br>
-              <a:rPr lang="en-US" sz="2400" i="1" smtClean="0"/>
-            </a:br>
-            <a:r>
-              <a:rPr lang="en-US" sz="2400" i="1" smtClean="0"/>
-              <a:t>      60000);</a:t>
-            </a:r>
-          </a:p>
-          <a:p>
-            <a:pPr marL="0" indent="0">
-              <a:buFont typeface="Arial"/>
-              <a:buNone/>
-            </a:pPr>
-            <a:r>
-              <a:rPr lang="en-US" sz="2800" smtClean="0"/>
-              <a:t>Parameters: proxy, web service URI, timeout in milliseconds</a:t>
-            </a:r>
-            <a:endParaRPr lang="en-US" i="1" smtClean="0"/>
-          </a:p>
-          <a:p>
-            <a:r>
-              <a:rPr lang="en-US" smtClean="0"/>
-              <a:t>Set the XML version and encoding</a:t>
-            </a:r>
-            <a:r>
-              <a:rPr lang="en-US" i="1" smtClean="0"/>
-              <a:t/>
-            </a:r>
-            <a:br>
-              <a:rPr lang="en-US" i="1" smtClean="0"/>
-            </a:br>
-            <a:r>
-              <a:rPr lang="en-US" sz="2400" i="1" smtClean="0"/>
-              <a:t>ht.setXmlVersionTag(</a:t>
-            </a:r>
-            <a:br>
-              <a:rPr lang="en-US" sz="2400" i="1" smtClean="0"/>
-            </a:br>
-            <a:r>
-              <a:rPr lang="en-US" sz="2400" i="1" smtClean="0"/>
-              <a:t>   "&lt;!--?xml version=\"1.0\" encoding= \"UTF-8\" ?--&gt;");</a:t>
-            </a:r>
-            <a:endParaRPr lang="en-US" sz="2400" i="1" dirty="0"/>
-          </a:p>
-        </p:txBody>
-      </p:sp>
-    </p:spTree>
-    <p:extLst>
-      <p:ext uri="{BB962C8B-B14F-4D97-AF65-F5344CB8AC3E}">
-        <p14:creationId xmlns:p14="http://schemas.microsoft.com/office/powerpoint/2010/main" val="3483137205"/>
-      </p:ext>
-    </p:extLst>
-  </p:cSld>
-  <p:clrMapOvr>
-    <a:masterClrMapping/>
-  </p:clrMapOvr>
-  <p:timing>
-    <p:tnLst>
-      <p:par>
-        <p:cTn xmlns:p14="http://schemas.microsoft.com/office/powerpoint/2010/main" id="1" dur="indefinite" restart="never" nodeType="tmRoot"/>
+        <p:cTn id="1" dur="indefinite" restart="never" nodeType="tmRoot"/>
       </p:par>
     </p:tnLst>
   </p:timing>
@@ -7885,14 +7513,14 @@
             <p:ph sz="half" idx="1"/>
             <p:extLst>
               <p:ext uri="{D42A27DB-BD31-4B8C-83A1-F6EECF244321}">
-                <p14:modId xmlns:p14="http://schemas.microsoft.com/office/powerpoint/2010/main" val="3712319773"/>
+                <p14:modId xmlns:p14="http://schemas.microsoft.com/office/powerpoint/2010/main" val="946562521"/>
               </p:ext>
             </p:extLst>
           </p:nvPr>
         </p:nvGraphicFramePr>
         <p:xfrm>
           <a:off x="457200" y="1404470"/>
-          <a:ext cx="3811200" cy="5152683"/>
+          <a:ext cx="3811200" cy="4725964"/>
         </p:xfrm>
         <a:graphic>
           <a:graphicData uri="http://schemas.openxmlformats.org/drawingml/2006/table">
@@ -8266,15 +7894,7 @@
                       </a:r>
                       <a:r>
                         <a:rPr lang="en-US" sz="2800" baseline="0" dirty="0" smtClean="0"/>
-                        <a:t> apps, </a:t>
-                      </a:r>
-                      <a:r>
-                        <a:rPr lang="en-US" sz="2800" u="none" baseline="0" dirty="0" smtClean="0">
-                          <a:solidFill>
-                            <a:schemeClr val="tx1"/>
-                          </a:solidFill>
-                        </a:rPr>
-                        <a:t>Fragments</a:t>
+                        <a:t> apps</a:t>
                       </a:r>
                       <a:endParaRPr lang="en-US" sz="2800" u="none" dirty="0" smtClean="0">
                         <a:solidFill>
@@ -8307,14 +7927,14 @@
             <p:ph sz="half" idx="2"/>
             <p:extLst>
               <p:ext uri="{D42A27DB-BD31-4B8C-83A1-F6EECF244321}">
-                <p14:modId xmlns:p14="http://schemas.microsoft.com/office/powerpoint/2010/main" val="1290654770"/>
+                <p14:modId xmlns:p14="http://schemas.microsoft.com/office/powerpoint/2010/main" val="1274138675"/>
               </p:ext>
             </p:extLst>
           </p:nvPr>
         </p:nvGraphicFramePr>
         <p:xfrm>
           <a:off x="4412426" y="1404470"/>
-          <a:ext cx="4274374" cy="3866745"/>
+          <a:ext cx="4274374" cy="4735073"/>
         </p:xfrm>
         <a:graphic>
           <a:graphicData uri="http://schemas.openxmlformats.org/drawingml/2006/table">
@@ -8354,6 +7974,75 @@
                     </a:p>
                   </a:txBody>
                   <a:tcPr/>
+                </a:tc>
+              </a:tr>
+              <a:tr h="654110">
+                <a:tc>
+                  <a:txBody>
+                    <a:bodyPr/>
+                    <a:lstStyle/>
+                    <a:p>
+                      <a:r>
+                        <a:rPr lang="en-US" sz="2800" dirty="0" smtClean="0"/>
+                        <a:t>3</a:t>
+                      </a:r>
+                      <a:endParaRPr lang="en-US" sz="2800" dirty="0"/>
+                    </a:p>
+                  </a:txBody>
+                  <a:tcPr>
+                    <a:solidFill>
+                      <a:schemeClr val="accent1">
+                        <a:lumMod val="20000"/>
+                        <a:lumOff val="80000"/>
+                      </a:schemeClr>
+                    </a:solidFill>
+                  </a:tcPr>
+                </a:tc>
+                <a:tc>
+                  <a:txBody>
+                    <a:bodyPr/>
+                    <a:lstStyle/>
+                    <a:p>
+                      <a:pPr marL="0" marR="0" indent="0" algn="l" defTabSz="457200" rtl="0" eaLnBrk="1" fontAlgn="auto" latinLnBrk="0" hangingPunct="1">
+                        <a:lnSpc>
+                          <a:spcPct val="100000"/>
+                        </a:lnSpc>
+                        <a:spcBef>
+                          <a:spcPts val="0"/>
+                        </a:spcBef>
+                        <a:spcAft>
+                          <a:spcPts val="0"/>
+                        </a:spcAft>
+                        <a:buClrTx/>
+                        <a:buSzTx/>
+                        <a:buFontTx/>
+                        <a:buNone/>
+                        <a:tabLst/>
+                        <a:defRPr/>
+                      </a:pPr>
+                      <a:r>
+                        <a:rPr lang="en-US" sz="2800" u="none" baseline="0" dirty="0" smtClean="0">
+                          <a:solidFill>
+                            <a:schemeClr val="tx1"/>
+                          </a:solidFill>
+                        </a:rPr>
+                        <a:t>Fragments</a:t>
+                      </a:r>
+                      <a:endParaRPr lang="en-US" sz="2800" u="none" dirty="0" smtClean="0">
+                        <a:solidFill>
+                          <a:schemeClr val="tx1"/>
+                        </a:solidFill>
+                      </a:endParaRPr>
+                    </a:p>
+                  </a:txBody>
+                  <a:tcPr>
+                    <a:solidFill>
+                      <a:schemeClr val="accent1">
+                        <a:lumMod val="20000"/>
+                        <a:lumOff val="80000"/>
+                      </a:schemeClr>
+                    </a:solidFill>
+                  </a:tcPr>
                 </a:tc>
               </a:tr>
               <a:tr h="957676">
@@ -8440,7 +8129,7 @@
                   </a:tcPr>
                 </a:tc>
               </a:tr>
-              <a:tr h="525177">
+              <a:tr h="597991">
                 <a:tc>
                   <a:txBody>
                     <a:bodyPr/>
@@ -8498,7 +8187,7 @@
                   </a:tcPr>
                 </a:tc>
               </a:tr>
-              <a:tr h="525177">
+              <a:tr h="617517">
                 <a:tc>
                   <a:txBody>
                     <a:bodyPr/>
@@ -8617,7 +8306,7 @@
                   </a:tcPr>
                 </a:tc>
               </a:tr>
-              <a:tr h="525177">
+              <a:tr h="574241">
                 <a:tc>
                   <a:txBody>
                     <a:bodyPr/>
@@ -8680,7 +8369,7 @@
   <p:timing>
     <p:tnLst>
       <p:par>
-        <p:cTn xmlns:p14="http://schemas.microsoft.com/office/powerpoint/2010/main" id="1" dur="indefinite" restart="never" nodeType="tmRoot"/>
+        <p:cTn id="1" dur="indefinite" restart="never" nodeType="tmRoot"/>
       </p:par>
     </p:tnLst>
   </p:timing>
@@ -8729,7 +8418,7 @@
       </p:grpSpPr>
       <p:sp>
         <p:nvSpPr>
-          <p:cNvPr id="2" name="Title 1"/>
+          <p:cNvPr id="4" name="Title 1"/>
           <p:cNvSpPr txBox="1">
             <a:spLocks/>
           </p:cNvSpPr>
@@ -8771,7 +8460,410 @@
                   <a:srgbClr val="0000FF"/>
                 </a:solidFill>
               </a:rPr>
-              <a:t>Sending the SOAP Request (continued)</a:t>
+              <a:t>Creating a SOAP Request (continued)</a:t>
+            </a:r>
+            <a:endParaRPr lang="en-US" dirty="0">
+              <a:solidFill>
+                <a:srgbClr val="0000FF"/>
+              </a:solidFill>
+            </a:endParaRPr>
+          </a:p>
+        </p:txBody>
+      </p:sp>
+      <p:sp>
+        <p:nvSpPr>
+          <p:cNvPr id="5" name="Content Placeholder 2"/>
+          <p:cNvSpPr txBox="1">
+            <a:spLocks/>
+          </p:cNvSpPr>
+          <p:nvPr/>
+        </p:nvSpPr>
+        <p:spPr>
+          <a:xfrm>
+            <a:off x="457200" y="1600200"/>
+            <a:ext cx="8229600" cy="4954002"/>
+          </a:xfrm>
+          <a:prstGeom prst="rect">
+            <a:avLst/>
+          </a:prstGeom>
+        </p:spPr>
+        <p:txBody>
+          <a:bodyPr>
+            <a:normAutofit lnSpcReduction="10000"/>
+          </a:bodyPr>
+          <a:lstStyle>
+            <a:lvl1pPr marL="342900" indent="-342900" algn="l" defTabSz="457200" rtl="0" eaLnBrk="1" latinLnBrk="0" hangingPunct="1">
+              <a:spcBef>
+                <a:spcPct val="20000"/>
+              </a:spcBef>
+              <a:buFont typeface="Arial"/>
+              <a:buChar char="•"/>
+              <a:defRPr sz="3200" kern="1200">
+                <a:solidFill>
+                  <a:schemeClr val="tx1"/>
+                </a:solidFill>
+                <a:latin typeface="+mn-lt"/>
+                <a:ea typeface="+mn-ea"/>
+                <a:cs typeface="+mn-cs"/>
+              </a:defRPr>
+            </a:lvl1pPr>
+            <a:lvl2pPr marL="742950" indent="-285750" algn="l" defTabSz="457200" rtl="0" eaLnBrk="1" latinLnBrk="0" hangingPunct="1">
+              <a:spcBef>
+                <a:spcPct val="20000"/>
+              </a:spcBef>
+              <a:buFont typeface="Arial"/>
+              <a:buChar char="–"/>
+              <a:defRPr sz="2800" kern="1200">
+                <a:solidFill>
+                  <a:schemeClr val="tx1"/>
+                </a:solidFill>
+                <a:latin typeface="+mn-lt"/>
+                <a:ea typeface="+mn-ea"/>
+                <a:cs typeface="+mn-cs"/>
+              </a:defRPr>
+            </a:lvl2pPr>
+            <a:lvl3pPr marL="1143000" indent="-228600" algn="l" defTabSz="457200" rtl="0" eaLnBrk="1" latinLnBrk="0" hangingPunct="1">
+              <a:spcBef>
+                <a:spcPct val="20000"/>
+              </a:spcBef>
+              <a:buFont typeface="Arial"/>
+              <a:buChar char="•"/>
+              <a:defRPr sz="2400" kern="1200">
+                <a:solidFill>
+                  <a:schemeClr val="tx1"/>
+                </a:solidFill>
+                <a:latin typeface="+mn-lt"/>
+                <a:ea typeface="+mn-ea"/>
+                <a:cs typeface="+mn-cs"/>
+              </a:defRPr>
+            </a:lvl3pPr>
+            <a:lvl4pPr marL="1600200" indent="-228600" algn="l" defTabSz="457200" rtl="0" eaLnBrk="1" latinLnBrk="0" hangingPunct="1">
+              <a:spcBef>
+                <a:spcPct val="20000"/>
+              </a:spcBef>
+              <a:buFont typeface="Arial"/>
+              <a:buChar char="–"/>
+              <a:defRPr sz="2000" kern="1200">
+                <a:solidFill>
+                  <a:schemeClr val="tx1"/>
+                </a:solidFill>
+                <a:latin typeface="+mn-lt"/>
+                <a:ea typeface="+mn-ea"/>
+                <a:cs typeface="+mn-cs"/>
+              </a:defRPr>
+            </a:lvl4pPr>
+            <a:lvl5pPr marL="2057400" indent="-228600" algn="l" defTabSz="457200" rtl="0" eaLnBrk="1" latinLnBrk="0" hangingPunct="1">
+              <a:spcBef>
+                <a:spcPct val="20000"/>
+              </a:spcBef>
+              <a:buFont typeface="Arial"/>
+              <a:buChar char="»"/>
+              <a:defRPr sz="2000" kern="1200">
+                <a:solidFill>
+                  <a:schemeClr val="tx1"/>
+                </a:solidFill>
+                <a:latin typeface="+mn-lt"/>
+                <a:ea typeface="+mn-ea"/>
+                <a:cs typeface="+mn-cs"/>
+              </a:defRPr>
+            </a:lvl5pPr>
+            <a:lvl6pPr marL="2514600" indent="-228600" algn="l" defTabSz="457200" rtl="0" eaLnBrk="1" latinLnBrk="0" hangingPunct="1">
+              <a:spcBef>
+                <a:spcPct val="20000"/>
+              </a:spcBef>
+              <a:buFont typeface="Arial"/>
+              <a:buChar char="•"/>
+              <a:defRPr sz="2000" kern="1200">
+                <a:solidFill>
+                  <a:schemeClr val="tx1"/>
+                </a:solidFill>
+                <a:latin typeface="+mn-lt"/>
+                <a:ea typeface="+mn-ea"/>
+                <a:cs typeface="+mn-cs"/>
+              </a:defRPr>
+            </a:lvl6pPr>
+            <a:lvl7pPr marL="2971800" indent="-228600" algn="l" defTabSz="457200" rtl="0" eaLnBrk="1" latinLnBrk="0" hangingPunct="1">
+              <a:spcBef>
+                <a:spcPct val="20000"/>
+              </a:spcBef>
+              <a:buFont typeface="Arial"/>
+              <a:buChar char="•"/>
+              <a:defRPr sz="2000" kern="1200">
+                <a:solidFill>
+                  <a:schemeClr val="tx1"/>
+                </a:solidFill>
+                <a:latin typeface="+mn-lt"/>
+                <a:ea typeface="+mn-ea"/>
+                <a:cs typeface="+mn-cs"/>
+              </a:defRPr>
+            </a:lvl7pPr>
+            <a:lvl8pPr marL="3429000" indent="-228600" algn="l" defTabSz="457200" rtl="0" eaLnBrk="1" latinLnBrk="0" hangingPunct="1">
+              <a:spcBef>
+                <a:spcPct val="20000"/>
+              </a:spcBef>
+              <a:buFont typeface="Arial"/>
+              <a:buChar char="•"/>
+              <a:defRPr sz="2000" kern="1200">
+                <a:solidFill>
+                  <a:schemeClr val="tx1"/>
+                </a:solidFill>
+                <a:latin typeface="+mn-lt"/>
+                <a:ea typeface="+mn-ea"/>
+                <a:cs typeface="+mn-cs"/>
+              </a:defRPr>
+            </a:lvl8pPr>
+            <a:lvl9pPr marL="3886200" indent="-228600" algn="l" defTabSz="457200" rtl="0" eaLnBrk="1" latinLnBrk="0" hangingPunct="1">
+              <a:spcBef>
+                <a:spcPct val="20000"/>
+              </a:spcBef>
+              <a:buFont typeface="Arial"/>
+              <a:buChar char="•"/>
+              <a:defRPr sz="2000" kern="1200">
+                <a:solidFill>
+                  <a:schemeClr val="tx1"/>
+                </a:solidFill>
+                <a:latin typeface="+mn-lt"/>
+                <a:ea typeface="+mn-ea"/>
+                <a:cs typeface="+mn-cs"/>
+              </a:defRPr>
+            </a:lvl9pPr>
+          </a:lstStyle>
+          <a:p>
+            <a:r>
+              <a:rPr lang="en-US" dirty="0" smtClean="0"/>
+              <a:t>Create an Envelope:</a:t>
+            </a:r>
+            <a:br>
+              <a:rPr lang="en-US" dirty="0" smtClean="0"/>
+            </a:br>
+            <a:r>
+              <a:rPr lang="en-US" sz="2400" i="1" dirty="0" err="1" smtClean="0"/>
+              <a:t>SoapSerializationEnvelope</a:t>
+            </a:r>
+            <a:r>
+              <a:rPr lang="en-US" sz="2400" i="1" dirty="0" smtClean="0"/>
+              <a:t> envelope = </a:t>
+            </a:r>
+            <a:br>
+              <a:rPr lang="en-US" sz="2400" i="1" dirty="0" smtClean="0"/>
+            </a:br>
+            <a:r>
+              <a:rPr lang="en-US" sz="2400" i="1" dirty="0" smtClean="0"/>
+              <a:t>            </a:t>
+            </a:r>
+            <a:r>
+              <a:rPr lang="en-US" sz="2400" b="1" i="1" dirty="0" smtClean="0"/>
+              <a:t>new </a:t>
+            </a:r>
+            <a:r>
+              <a:rPr lang="en-US" sz="2400" i="1" dirty="0" err="1" smtClean="0"/>
+              <a:t>SoapSerializationEnvelope</a:t>
+            </a:r>
+            <a:r>
+              <a:rPr lang="en-US" sz="2400" i="1" dirty="0" smtClean="0"/>
+              <a:t>(SoapEnvelope.</a:t>
+            </a:r>
+            <a:r>
+              <a:rPr lang="en-US" sz="2400" b="1" i="1" dirty="0" smtClean="0"/>
+              <a:t>VER12</a:t>
+            </a:r>
+            <a:r>
+              <a:rPr lang="en-US" sz="2400" i="1" dirty="0" smtClean="0"/>
+              <a:t>);</a:t>
+            </a:r>
+          </a:p>
+          <a:p>
+            <a:pPr lvl="1">
+              <a:buFont typeface="Courier New"/>
+              <a:buChar char="o"/>
+            </a:pPr>
+            <a:r>
+              <a:rPr lang="en-US" dirty="0" smtClean="0"/>
+              <a:t>Pass the SOAP version, 1.2, to the constructor</a:t>
+            </a:r>
+          </a:p>
+          <a:p>
+            <a:r>
+              <a:rPr lang="en-US" dirty="0" smtClean="0"/>
+              <a:t>Initialize the envelope:</a:t>
+            </a:r>
+          </a:p>
+          <a:p>
+            <a:pPr lvl="1">
+              <a:buFont typeface="Courier New"/>
+              <a:buChar char="o"/>
+            </a:pPr>
+            <a:r>
+              <a:rPr lang="en-US" dirty="0" err="1" smtClean="0"/>
+              <a:t>dotNet</a:t>
+            </a:r>
+            <a:r>
+              <a:rPr lang="en-US" dirty="0" smtClean="0"/>
+              <a:t> property: Set to true if the web service you are consuming is written using .NET:</a:t>
+            </a:r>
+            <a:r>
+              <a:rPr lang="en-US" i="1" dirty="0" smtClean="0"/>
+              <a:t/>
+            </a:r>
+            <a:br>
+              <a:rPr lang="en-US" i="1" dirty="0" smtClean="0"/>
+            </a:br>
+            <a:r>
+              <a:rPr lang="en-US" i="1" dirty="0" smtClean="0"/>
+              <a:t>     </a:t>
+            </a:r>
+            <a:r>
+              <a:rPr lang="en-US" sz="2400" i="1" dirty="0" err="1" smtClean="0"/>
+              <a:t>envelope.dotNet</a:t>
+            </a:r>
+            <a:r>
+              <a:rPr lang="en-US" sz="2400" i="1" dirty="0" smtClean="0"/>
+              <a:t> = true;</a:t>
+            </a:r>
+          </a:p>
+          <a:p>
+            <a:pPr lvl="1">
+              <a:buFont typeface="Courier New"/>
+              <a:buChar char="o"/>
+            </a:pPr>
+            <a:r>
+              <a:rPr lang="en-US" dirty="0" err="1" smtClean="0"/>
+              <a:t>setOutputSoapObject</a:t>
+            </a:r>
+            <a:r>
+              <a:rPr lang="en-US" dirty="0" smtClean="0"/>
+              <a:t>: pass in an instance of </a:t>
+            </a:r>
+            <a:r>
+              <a:rPr lang="en-US" dirty="0" err="1" smtClean="0"/>
+              <a:t>soapObject</a:t>
+            </a:r>
+            <a:r>
+              <a:rPr lang="en-US" i="1" dirty="0" smtClean="0"/>
+              <a:t/>
+            </a:r>
+            <a:br>
+              <a:rPr lang="en-US" i="1" dirty="0" smtClean="0"/>
+            </a:br>
+            <a:r>
+              <a:rPr lang="en-US" i="1" dirty="0" smtClean="0"/>
+              <a:t>     </a:t>
+            </a:r>
+            <a:r>
+              <a:rPr lang="en-US" sz="2400" i="1" dirty="0" err="1" smtClean="0"/>
+              <a:t>envelope.setOutputSoapObject</a:t>
+            </a:r>
+            <a:r>
+              <a:rPr lang="en-US" sz="2400" i="1" dirty="0" smtClean="0"/>
+              <a:t>(request);</a:t>
+            </a:r>
+            <a:endParaRPr lang="en-US" sz="2400" i="1" dirty="0"/>
+          </a:p>
+        </p:txBody>
+      </p:sp>
+    </p:spTree>
+    <p:extLst>
+      <p:ext uri="{BB962C8B-B14F-4D97-AF65-F5344CB8AC3E}">
+        <p14:creationId xmlns:p14="http://schemas.microsoft.com/office/powerpoint/2010/main" val="1643403760"/>
+      </p:ext>
+    </p:extLst>
+  </p:cSld>
+  <p:clrMapOvr>
+    <a:masterClrMapping/>
+  </p:clrMapOvr>
+  <p:timing>
+    <p:tnLst>
+      <p:par>
+        <p:cTn id="1" dur="indefinite" restart="never" nodeType="tmRoot"/>
+      </p:par>
+    </p:tnLst>
+  </p:timing>
+</p:sld>
+</file>
+
+<file path=ppt/slides/slide21.xml><?xml version="1.0" encoding="utf-8"?>
+<p:sld xmlns:a="http://schemas.openxmlformats.org/drawingml/2006/main" xmlns:r="http://schemas.openxmlformats.org/officeDocument/2006/relationships" xmlns:p="http://schemas.openxmlformats.org/presentationml/2006/main">
+  <p:cSld>
+    <p:bg>
+      <p:bgPr>
+        <a:gradFill flip="none" rotWithShape="1">
+          <a:gsLst>
+            <a:gs pos="100000">
+              <a:schemeClr val="bg2">
+                <a:lumMod val="25000"/>
+                <a:alpha val="68000"/>
+              </a:schemeClr>
+            </a:gs>
+            <a:gs pos="55000">
+              <a:schemeClr val="bg2">
+                <a:lumMod val="50000"/>
+                <a:alpha val="30000"/>
+              </a:schemeClr>
+            </a:gs>
+          </a:gsLst>
+          <a:lin ang="5400000" scaled="0"/>
+          <a:tileRect/>
+        </a:gradFill>
+        <a:effectLst/>
+      </p:bgPr>
+    </p:bg>
+    <p:spTree>
+      <p:nvGrpSpPr>
+        <p:cNvPr id="1" name=""/>
+        <p:cNvGrpSpPr/>
+        <p:nvPr/>
+      </p:nvGrpSpPr>
+      <p:grpSpPr>
+        <a:xfrm>
+          <a:off x="0" y="0"/>
+          <a:ext cx="0" cy="0"/>
+          <a:chOff x="0" y="0"/>
+          <a:chExt cx="0" cy="0"/>
+        </a:xfrm>
+      </p:grpSpPr>
+      <p:sp>
+        <p:nvSpPr>
+          <p:cNvPr id="2" name="Title 1"/>
+          <p:cNvSpPr txBox="1">
+            <a:spLocks/>
+          </p:cNvSpPr>
+          <p:nvPr/>
+        </p:nvSpPr>
+        <p:spPr>
+          <a:xfrm>
+            <a:off x="457200" y="274638"/>
+            <a:ext cx="8229600" cy="1143000"/>
+          </a:xfrm>
+          <a:prstGeom prst="rect">
+            <a:avLst/>
+          </a:prstGeom>
+        </p:spPr>
+        <p:txBody>
+          <a:bodyPr/>
+          <a:lstStyle>
+            <a:lvl1pPr algn="ctr" defTabSz="457200" rtl="0" eaLnBrk="1" latinLnBrk="0" hangingPunct="1">
+              <a:spcBef>
+                <a:spcPct val="0"/>
+              </a:spcBef>
+              <a:buNone/>
+              <a:defRPr sz="4400" kern="1200">
+                <a:solidFill>
+                  <a:schemeClr val="tx1"/>
+                </a:solidFill>
+                <a:latin typeface="+mj-lt"/>
+                <a:ea typeface="+mj-ea"/>
+                <a:cs typeface="+mj-cs"/>
+              </a:defRPr>
+            </a:lvl1pPr>
+          </a:lstStyle>
+          <a:p>
+            <a:r>
+              <a:rPr lang="en-US" smtClean="0">
+                <a:solidFill>
+                  <a:srgbClr val="0000FF"/>
+                </a:solidFill>
+              </a:rPr>
+              <a:t>Sending the SOAP Request</a:t>
             </a:r>
             <a:endParaRPr lang="en-US" dirty="0">
               <a:solidFill>
@@ -8942,6 +9034,362 @@
           <a:p>
             <a:r>
               <a:rPr lang="en-US" smtClean="0"/>
+              <a:t>Instantiate an instance of HttpTrasportSE</a:t>
+            </a:r>
+            <a:r>
+              <a:rPr lang="en-US" i="1" smtClean="0"/>
+              <a:t/>
+            </a:r>
+            <a:br>
+              <a:rPr lang="en-US" i="1" smtClean="0"/>
+            </a:br>
+            <a:r>
+              <a:rPr lang="en-US" sz="2400" i="1" smtClean="0"/>
+              <a:t>HttpTransportSE ht = new HttpTransportSE(</a:t>
+            </a:r>
+            <a:br>
+              <a:rPr lang="en-US" sz="2400" i="1" smtClean="0"/>
+            </a:br>
+            <a:r>
+              <a:rPr lang="en-US" sz="2400" i="1" smtClean="0"/>
+              <a:t> </a:t>
+            </a:r>
+            <a:r>
+              <a:rPr lang="en-US" sz="2000" i="1" smtClean="0"/>
+              <a:t>   Proxy.NO_PROXY,</a:t>
+            </a:r>
+            <a:r>
+              <a:rPr lang="en-US" sz="2400" i="1" smtClean="0"/>
+              <a:t/>
+            </a:r>
+            <a:br>
+              <a:rPr lang="en-US" sz="2400" i="1" smtClean="0"/>
+            </a:br>
+            <a:r>
+              <a:rPr lang="en-US" sz="2400" i="1" smtClean="0"/>
+              <a:t>    "http://wsf.cdyne.com/WeatherWS/ Weather.asmx",</a:t>
+            </a:r>
+            <a:br>
+              <a:rPr lang="en-US" sz="2400" i="1" smtClean="0"/>
+            </a:br>
+            <a:r>
+              <a:rPr lang="en-US" sz="2400" i="1" smtClean="0"/>
+              <a:t>      60000);</a:t>
+            </a:r>
+          </a:p>
+          <a:p>
+            <a:pPr marL="0" indent="0">
+              <a:buFont typeface="Arial"/>
+              <a:buNone/>
+            </a:pPr>
+            <a:r>
+              <a:rPr lang="en-US" sz="2800" smtClean="0"/>
+              <a:t>Parameters: proxy, web service URI, timeout in milliseconds</a:t>
+            </a:r>
+            <a:endParaRPr lang="en-US" i="1" smtClean="0"/>
+          </a:p>
+          <a:p>
+            <a:r>
+              <a:rPr lang="en-US" smtClean="0"/>
+              <a:t>Set the XML version and encoding</a:t>
+            </a:r>
+            <a:r>
+              <a:rPr lang="en-US" i="1" smtClean="0"/>
+              <a:t/>
+            </a:r>
+            <a:br>
+              <a:rPr lang="en-US" i="1" smtClean="0"/>
+            </a:br>
+            <a:r>
+              <a:rPr lang="en-US" sz="2400" i="1" smtClean="0"/>
+              <a:t>ht.setXmlVersionTag(</a:t>
+            </a:r>
+            <a:br>
+              <a:rPr lang="en-US" sz="2400" i="1" smtClean="0"/>
+            </a:br>
+            <a:r>
+              <a:rPr lang="en-US" sz="2400" i="1" smtClean="0"/>
+              <a:t>   "&lt;!--?xml version=\"1.0\" encoding= \"UTF-8\" ?--&gt;");</a:t>
+            </a:r>
+            <a:endParaRPr lang="en-US" sz="2400" i="1" dirty="0"/>
+          </a:p>
+        </p:txBody>
+      </p:sp>
+    </p:spTree>
+    <p:extLst>
+      <p:ext uri="{BB962C8B-B14F-4D97-AF65-F5344CB8AC3E}">
+        <p14:creationId xmlns:p14="http://schemas.microsoft.com/office/powerpoint/2010/main" val="3483137205"/>
+      </p:ext>
+    </p:extLst>
+  </p:cSld>
+  <p:clrMapOvr>
+    <a:masterClrMapping/>
+  </p:clrMapOvr>
+  <p:timing>
+    <p:tnLst>
+      <p:par>
+        <p:cTn id="1" dur="indefinite" restart="never" nodeType="tmRoot"/>
+      </p:par>
+    </p:tnLst>
+  </p:timing>
+</p:sld>
+</file>
+
+<file path=ppt/slides/slide22.xml><?xml version="1.0" encoding="utf-8"?>
+<p:sld xmlns:a="http://schemas.openxmlformats.org/drawingml/2006/main" xmlns:r="http://schemas.openxmlformats.org/officeDocument/2006/relationships" xmlns:p="http://schemas.openxmlformats.org/presentationml/2006/main">
+  <p:cSld>
+    <p:bg>
+      <p:bgPr>
+        <a:gradFill flip="none" rotWithShape="1">
+          <a:gsLst>
+            <a:gs pos="100000">
+              <a:schemeClr val="bg2">
+                <a:lumMod val="25000"/>
+                <a:alpha val="68000"/>
+              </a:schemeClr>
+            </a:gs>
+            <a:gs pos="55000">
+              <a:schemeClr val="bg2">
+                <a:lumMod val="50000"/>
+                <a:alpha val="30000"/>
+              </a:schemeClr>
+            </a:gs>
+          </a:gsLst>
+          <a:lin ang="5400000" scaled="0"/>
+          <a:tileRect/>
+        </a:gradFill>
+        <a:effectLst/>
+      </p:bgPr>
+    </p:bg>
+    <p:spTree>
+      <p:nvGrpSpPr>
+        <p:cNvPr id="1" name=""/>
+        <p:cNvGrpSpPr/>
+        <p:nvPr/>
+      </p:nvGrpSpPr>
+      <p:grpSpPr>
+        <a:xfrm>
+          <a:off x="0" y="0"/>
+          <a:ext cx="0" cy="0"/>
+          <a:chOff x="0" y="0"/>
+          <a:chExt cx="0" cy="0"/>
+        </a:xfrm>
+      </p:grpSpPr>
+      <p:sp>
+        <p:nvSpPr>
+          <p:cNvPr id="2" name="Title 1"/>
+          <p:cNvSpPr txBox="1">
+            <a:spLocks/>
+          </p:cNvSpPr>
+          <p:nvPr/>
+        </p:nvSpPr>
+        <p:spPr>
+          <a:xfrm>
+            <a:off x="457200" y="274638"/>
+            <a:ext cx="8229600" cy="1143000"/>
+          </a:xfrm>
+          <a:prstGeom prst="rect">
+            <a:avLst/>
+          </a:prstGeom>
+        </p:spPr>
+        <p:txBody>
+          <a:bodyPr>
+            <a:normAutofit fontScale="90000"/>
+          </a:bodyPr>
+          <a:lstStyle>
+            <a:lvl1pPr algn="ctr" defTabSz="457200" rtl="0" eaLnBrk="1" latinLnBrk="0" hangingPunct="1">
+              <a:spcBef>
+                <a:spcPct val="0"/>
+              </a:spcBef>
+              <a:buNone/>
+              <a:defRPr sz="4400" kern="1200">
+                <a:solidFill>
+                  <a:schemeClr val="tx1"/>
+                </a:solidFill>
+                <a:latin typeface="+mj-lt"/>
+                <a:ea typeface="+mj-ea"/>
+                <a:cs typeface="+mj-cs"/>
+              </a:defRPr>
+            </a:lvl1pPr>
+          </a:lstStyle>
+          <a:p>
+            <a:r>
+              <a:rPr lang="en-US" smtClean="0">
+                <a:solidFill>
+                  <a:srgbClr val="0000FF"/>
+                </a:solidFill>
+              </a:rPr>
+              <a:t>Sending the SOAP Request (continued)</a:t>
+            </a:r>
+            <a:endParaRPr lang="en-US" dirty="0">
+              <a:solidFill>
+                <a:srgbClr val="0000FF"/>
+              </a:solidFill>
+            </a:endParaRPr>
+          </a:p>
+        </p:txBody>
+      </p:sp>
+      <p:sp>
+        <p:nvSpPr>
+          <p:cNvPr id="3" name="Content Placeholder 2"/>
+          <p:cNvSpPr txBox="1">
+            <a:spLocks/>
+          </p:cNvSpPr>
+          <p:nvPr/>
+        </p:nvSpPr>
+        <p:spPr>
+          <a:xfrm>
+            <a:off x="457200" y="1600200"/>
+            <a:ext cx="8229600" cy="4525963"/>
+          </a:xfrm>
+          <a:prstGeom prst="rect">
+            <a:avLst/>
+          </a:prstGeom>
+        </p:spPr>
+        <p:txBody>
+          <a:bodyPr>
+            <a:normAutofit/>
+          </a:bodyPr>
+          <a:lstStyle>
+            <a:lvl1pPr marL="342900" indent="-342900" algn="l" defTabSz="457200" rtl="0" eaLnBrk="1" latinLnBrk="0" hangingPunct="1">
+              <a:spcBef>
+                <a:spcPct val="20000"/>
+              </a:spcBef>
+              <a:buFont typeface="Arial"/>
+              <a:buChar char="•"/>
+              <a:defRPr sz="3200" kern="1200">
+                <a:solidFill>
+                  <a:schemeClr val="tx1"/>
+                </a:solidFill>
+                <a:latin typeface="+mn-lt"/>
+                <a:ea typeface="+mn-ea"/>
+                <a:cs typeface="+mn-cs"/>
+              </a:defRPr>
+            </a:lvl1pPr>
+            <a:lvl2pPr marL="742950" indent="-285750" algn="l" defTabSz="457200" rtl="0" eaLnBrk="1" latinLnBrk="0" hangingPunct="1">
+              <a:spcBef>
+                <a:spcPct val="20000"/>
+              </a:spcBef>
+              <a:buFont typeface="Arial"/>
+              <a:buChar char="–"/>
+              <a:defRPr sz="2800" kern="1200">
+                <a:solidFill>
+                  <a:schemeClr val="tx1"/>
+                </a:solidFill>
+                <a:latin typeface="+mn-lt"/>
+                <a:ea typeface="+mn-ea"/>
+                <a:cs typeface="+mn-cs"/>
+              </a:defRPr>
+            </a:lvl2pPr>
+            <a:lvl3pPr marL="1143000" indent="-228600" algn="l" defTabSz="457200" rtl="0" eaLnBrk="1" latinLnBrk="0" hangingPunct="1">
+              <a:spcBef>
+                <a:spcPct val="20000"/>
+              </a:spcBef>
+              <a:buFont typeface="Arial"/>
+              <a:buChar char="•"/>
+              <a:defRPr sz="2400" kern="1200">
+                <a:solidFill>
+                  <a:schemeClr val="tx1"/>
+                </a:solidFill>
+                <a:latin typeface="+mn-lt"/>
+                <a:ea typeface="+mn-ea"/>
+                <a:cs typeface="+mn-cs"/>
+              </a:defRPr>
+            </a:lvl3pPr>
+            <a:lvl4pPr marL="1600200" indent="-228600" algn="l" defTabSz="457200" rtl="0" eaLnBrk="1" latinLnBrk="0" hangingPunct="1">
+              <a:spcBef>
+                <a:spcPct val="20000"/>
+              </a:spcBef>
+              <a:buFont typeface="Arial"/>
+              <a:buChar char="–"/>
+              <a:defRPr sz="2000" kern="1200">
+                <a:solidFill>
+                  <a:schemeClr val="tx1"/>
+                </a:solidFill>
+                <a:latin typeface="+mn-lt"/>
+                <a:ea typeface="+mn-ea"/>
+                <a:cs typeface="+mn-cs"/>
+              </a:defRPr>
+            </a:lvl4pPr>
+            <a:lvl5pPr marL="2057400" indent="-228600" algn="l" defTabSz="457200" rtl="0" eaLnBrk="1" latinLnBrk="0" hangingPunct="1">
+              <a:spcBef>
+                <a:spcPct val="20000"/>
+              </a:spcBef>
+              <a:buFont typeface="Arial"/>
+              <a:buChar char="»"/>
+              <a:defRPr sz="2000" kern="1200">
+                <a:solidFill>
+                  <a:schemeClr val="tx1"/>
+                </a:solidFill>
+                <a:latin typeface="+mn-lt"/>
+                <a:ea typeface="+mn-ea"/>
+                <a:cs typeface="+mn-cs"/>
+              </a:defRPr>
+            </a:lvl5pPr>
+            <a:lvl6pPr marL="2514600" indent="-228600" algn="l" defTabSz="457200" rtl="0" eaLnBrk="1" latinLnBrk="0" hangingPunct="1">
+              <a:spcBef>
+                <a:spcPct val="20000"/>
+              </a:spcBef>
+              <a:buFont typeface="Arial"/>
+              <a:buChar char="•"/>
+              <a:defRPr sz="2000" kern="1200">
+                <a:solidFill>
+                  <a:schemeClr val="tx1"/>
+                </a:solidFill>
+                <a:latin typeface="+mn-lt"/>
+                <a:ea typeface="+mn-ea"/>
+                <a:cs typeface="+mn-cs"/>
+              </a:defRPr>
+            </a:lvl6pPr>
+            <a:lvl7pPr marL="2971800" indent="-228600" algn="l" defTabSz="457200" rtl="0" eaLnBrk="1" latinLnBrk="0" hangingPunct="1">
+              <a:spcBef>
+                <a:spcPct val="20000"/>
+              </a:spcBef>
+              <a:buFont typeface="Arial"/>
+              <a:buChar char="•"/>
+              <a:defRPr sz="2000" kern="1200">
+                <a:solidFill>
+                  <a:schemeClr val="tx1"/>
+                </a:solidFill>
+                <a:latin typeface="+mn-lt"/>
+                <a:ea typeface="+mn-ea"/>
+                <a:cs typeface="+mn-cs"/>
+              </a:defRPr>
+            </a:lvl7pPr>
+            <a:lvl8pPr marL="3429000" indent="-228600" algn="l" defTabSz="457200" rtl="0" eaLnBrk="1" latinLnBrk="0" hangingPunct="1">
+              <a:spcBef>
+                <a:spcPct val="20000"/>
+              </a:spcBef>
+              <a:buFont typeface="Arial"/>
+              <a:buChar char="•"/>
+              <a:defRPr sz="2000" kern="1200">
+                <a:solidFill>
+                  <a:schemeClr val="tx1"/>
+                </a:solidFill>
+                <a:latin typeface="+mn-lt"/>
+                <a:ea typeface="+mn-ea"/>
+                <a:cs typeface="+mn-cs"/>
+              </a:defRPr>
+            </a:lvl8pPr>
+            <a:lvl9pPr marL="3886200" indent="-228600" algn="l" defTabSz="457200" rtl="0" eaLnBrk="1" latinLnBrk="0" hangingPunct="1">
+              <a:spcBef>
+                <a:spcPct val="20000"/>
+              </a:spcBef>
+              <a:buFont typeface="Arial"/>
+              <a:buChar char="•"/>
+              <a:defRPr sz="2000" kern="1200">
+                <a:solidFill>
+                  <a:schemeClr val="tx1"/>
+                </a:solidFill>
+                <a:latin typeface="+mn-lt"/>
+                <a:ea typeface="+mn-ea"/>
+                <a:cs typeface="+mn-cs"/>
+              </a:defRPr>
+            </a:lvl9pPr>
+          </a:lstStyle>
+          <a:p>
+            <a:r>
+              <a:rPr lang="en-US" smtClean="0"/>
               <a:t>Make a call to the web service:</a:t>
             </a:r>
             <a:br>
@@ -9002,14 +9450,14 @@
   <p:timing>
     <p:tnLst>
       <p:par>
-        <p:cTn xmlns:p14="http://schemas.microsoft.com/office/powerpoint/2010/main" id="1" dur="indefinite" restart="never" nodeType="tmRoot"/>
+        <p:cTn id="1" dur="indefinite" restart="never" nodeType="tmRoot"/>
       </p:par>
     </p:tnLst>
   </p:timing>
 </p:sld>
 </file>
 
-<file path=ppt/slides/slide21.xml><?xml version="1.0" encoding="utf-8"?>
+<file path=ppt/slides/slide23.xml><?xml version="1.0" encoding="utf-8"?>
 <p:sld xmlns:a="http://schemas.openxmlformats.org/drawingml/2006/main" xmlns:r="http://schemas.openxmlformats.org/officeDocument/2006/relationships" xmlns:p="http://schemas.openxmlformats.org/presentationml/2006/main">
   <p:cSld>
     <p:bg>
@@ -9322,14 +9770,14 @@
   <p:timing>
     <p:tnLst>
       <p:par>
-        <p:cTn xmlns:p14="http://schemas.microsoft.com/office/powerpoint/2010/main" id="1" dur="indefinite" restart="never" nodeType="tmRoot"/>
+        <p:cTn id="1" dur="indefinite" restart="never" nodeType="tmRoot"/>
       </p:par>
     </p:tnLst>
   </p:timing>
 </p:sld>
 </file>
 
-<file path=ppt/slides/slide22.xml><?xml version="1.0" encoding="utf-8"?>
+<file path=ppt/slides/slide24.xml><?xml version="1.0" encoding="utf-8"?>
 <p:sld xmlns:a="http://schemas.openxmlformats.org/drawingml/2006/main" xmlns:r="http://schemas.openxmlformats.org/officeDocument/2006/relationships" xmlns:p="http://schemas.openxmlformats.org/presentationml/2006/main">
   <p:cSld>
     <p:bg>
@@ -9619,14 +10067,14 @@
   <p:timing>
     <p:tnLst>
       <p:par>
-        <p:cTn xmlns:p14="http://schemas.microsoft.com/office/powerpoint/2010/main" id="1" dur="indefinite" restart="never" nodeType="tmRoot"/>
+        <p:cTn id="1" dur="indefinite" restart="never" nodeType="tmRoot"/>
       </p:par>
     </p:tnLst>
   </p:timing>
 </p:sld>
 </file>
 
-<file path=ppt/slides/slide23.xml><?xml version="1.0" encoding="utf-8"?>
+<file path=ppt/slides/slide25.xml><?xml version="1.0" encoding="utf-8"?>
 <p:sld xmlns:a="http://schemas.openxmlformats.org/drawingml/2006/main" xmlns:r="http://schemas.openxmlformats.org/officeDocument/2006/relationships" xmlns:p="http://schemas.openxmlformats.org/presentationml/2006/main">
   <p:cSld>
     <p:bg>
@@ -9728,15 +10176,7 @@
           <a:p>
             <a:r>
               <a:rPr lang="en-US" dirty="0" smtClean="0"/>
-              <a:t>W3Schools SOAP </a:t>
-            </a:r>
-            <a:r>
-              <a:rPr lang="en-US" dirty="0" smtClean="0"/>
-              <a:t>tutorial</a:t>
-            </a:r>
-            <a:r>
-              <a:rPr lang="en-US" dirty="0" smtClean="0"/>
-              <a:t/>
+              <a:t>W3Schools SOAP tutorial</a:t>
             </a:r>
             <a:br>
               <a:rPr lang="en-US" dirty="0" smtClean="0"/>
@@ -9755,11 +10195,7 @@
           <a:p>
             <a:r>
               <a:rPr lang="en-US" dirty="0" smtClean="0"/>
-              <a:t>ksoap2</a:t>
-            </a:r>
-            <a:r>
-              <a:rPr lang="en-US" dirty="0" smtClean="0"/>
-              <a:t>-android home page:</a:t>
+              <a:t>ksoap2-android home page:</a:t>
             </a:r>
             <a:br>
               <a:rPr lang="en-US" dirty="0" smtClean="0"/>
@@ -9775,15 +10211,7 @@
           <a:p>
             <a:r>
               <a:rPr lang="en-US" dirty="0" smtClean="0"/>
-              <a:t>ksoap2 </a:t>
-            </a:r>
-            <a:r>
-              <a:rPr lang="en-US" dirty="0" smtClean="0"/>
-              <a:t>API </a:t>
-            </a:r>
-            <a:r>
-              <a:rPr lang="en-US" dirty="0" smtClean="0"/>
-              <a:t>documentation:</a:t>
+              <a:t>ksoap2 API documentation:</a:t>
             </a:r>
             <a:br>
               <a:rPr lang="en-US" dirty="0" smtClean="0"/>
@@ -9792,13 +10220,7 @@
               <a:rPr lang="en-US" dirty="0" smtClean="0">
                 <a:hlinkClick r:id="rId4"/>
               </a:rPr>
-              <a:t>http://www.kobjects.org/ksoap2/doc/api/overview-</a:t>
-            </a:r>
-            <a:r>
-              <a:rPr lang="en-US" dirty="0" smtClean="0">
-                <a:hlinkClick r:id="rId4"/>
-              </a:rPr>
-              <a:t>summary.html</a:t>
+              <a:t>http://www.kobjects.org/ksoap2/doc/api/overview-summary.html</a:t>
             </a:r>
             <a:endParaRPr lang="en-US" dirty="0" smtClean="0"/>
           </a:p>
@@ -9830,7 +10252,6 @@
               <a:rPr lang="en-US" dirty="0" smtClean="0"/>
               <a:t> </a:t>
             </a:r>
-            <a:endParaRPr lang="en-US" dirty="0" smtClean="0"/>
           </a:p>
           <a:p>
             <a:endParaRPr lang="it-IT" dirty="0"/>
@@ -9850,7 +10271,7 @@
   <p:timing>
     <p:tnLst>
       <p:par>
-        <p:cTn xmlns:p14="http://schemas.microsoft.com/office/powerpoint/2010/main" id="1" dur="indefinite" restart="never" nodeType="tmRoot"/>
+        <p:cTn id="1" dur="indefinite" restart="never" nodeType="tmRoot"/>
       </p:par>
     </p:tnLst>
   </p:timing>
@@ -9972,7 +10393,7 @@
   <p:timing>
     <p:tnLst>
       <p:par>
-        <p:cTn xmlns:p14="http://schemas.microsoft.com/office/powerpoint/2010/main" id="1" dur="indefinite" restart="never" nodeType="tmRoot"/>
+        <p:cTn id="1" dur="indefinite" restart="never" nodeType="tmRoot"/>
       </p:par>
     </p:tnLst>
   </p:timing>
@@ -10413,7 +10834,7 @@
   <p:timing>
     <p:tnLst>
       <p:par>
-        <p:cTn xmlns:p14="http://schemas.microsoft.com/office/powerpoint/2010/main" id="1" dur="indefinite" restart="never" nodeType="tmRoot"/>
+        <p:cTn id="1" dur="indefinite" restart="never" nodeType="tmRoot"/>
       </p:par>
     </p:tnLst>
   </p:timing>
@@ -10531,7 +10952,7 @@
   <p:timing>
     <p:tnLst>
       <p:par>
-        <p:cTn xmlns:p14="http://schemas.microsoft.com/office/powerpoint/2010/main" id="1" dur="indefinite" restart="never" nodeType="tmRoot"/>
+        <p:cTn id="1" dur="indefinite" restart="never" nodeType="tmRoot"/>
       </p:par>
     </p:tnLst>
   </p:timing>
@@ -10652,7 +11073,7 @@
   <p:timing>
     <p:tnLst>
       <p:par>
-        <p:cTn xmlns:p14="http://schemas.microsoft.com/office/powerpoint/2010/main" id="1" dur="indefinite" restart="never" nodeType="tmRoot"/>
+        <p:cTn id="1" dur="indefinite" restart="never" nodeType="tmRoot"/>
       </p:par>
     </p:tnLst>
   </p:timing>
@@ -10693,7 +11114,11 @@
           <a:p>
             <a:r>
               <a:rPr lang="en-US" dirty="0" smtClean="0"/>
-              <a:t>SOAP Protocol</a:t>
+              <a:t>REST </a:t>
+            </a:r>
+            <a:r>
+              <a:rPr lang="en-US" dirty="0" smtClean="0"/>
+              <a:t>Protocol</a:t>
             </a:r>
             <a:endParaRPr lang="en-US" dirty="0"/>
           </a:p>
@@ -10712,99 +11137,14 @@
         <p:spPr/>
         <p:txBody>
           <a:bodyPr>
-            <a:normAutofit fontScale="70000" lnSpcReduction="20000"/>
+            <a:normAutofit/>
           </a:bodyPr>
           <a:lstStyle/>
           <a:p>
             <a:pPr marL="0" indent="0">
               <a:buNone/>
             </a:pPr>
-            <a:r>
-              <a:rPr lang="en-US" dirty="0" err="1"/>
-              <a:t>TheSimpleObjectAccessProtocol</a:t>
-            </a:r>
-            <a:r>
-              <a:rPr lang="en-US" dirty="0"/>
-              <a:t>(SOAP)</a:t>
-            </a:r>
-            <a:r>
-              <a:rPr lang="en-US" dirty="0" err="1"/>
-              <a:t>isaplatform-independentprotocolthatuses</a:t>
-            </a:r>
             <a:endParaRPr lang="en-US" dirty="0"/>
-          </a:p>
-          <a:p>
-            <a:pPr marL="0" indent="0">
-              <a:buNone/>
-            </a:pPr>
-            <a:endParaRPr lang="en-US" dirty="0"/>
-          </a:p>
-          <a:p>
-            <a:pPr marL="0" indent="0">
-              <a:buNone/>
-            </a:pPr>
-            <a:r>
-              <a:rPr lang="en-US" dirty="0"/>
-              <a:t>XMLtomakeremoteprocedurecalls,typicallyoverHTTP.Eachrequestandresponseis</a:t>
-            </a:r>
-          </a:p>
-          <a:p>
-            <a:pPr marL="0" indent="0">
-              <a:buNone/>
-            </a:pPr>
-            <a:endParaRPr lang="en-US" dirty="0"/>
-          </a:p>
-          <a:p>
-            <a:pPr marL="0" indent="0">
-              <a:buNone/>
-            </a:pPr>
-            <a:r>
-              <a:rPr lang="en-US" dirty="0" err="1"/>
-              <a:t>packagedinaSOAPmessage</a:t>
-            </a:r>
-            <a:r>
-              <a:rPr lang="en-US" dirty="0"/>
-              <a:t>—</a:t>
-            </a:r>
-            <a:r>
-              <a:rPr lang="en-US" dirty="0" err="1"/>
-              <a:t>anXMLmessagecontainingtheinformationthataweb</a:t>
-            </a:r>
-            <a:endParaRPr lang="en-US" dirty="0"/>
-          </a:p>
-          <a:p>
-            <a:pPr marL="0" indent="0">
-              <a:buNone/>
-            </a:pPr>
-            <a:endParaRPr lang="en-US" dirty="0"/>
-          </a:p>
-          <a:p>
-            <a:pPr marL="0" indent="0">
-              <a:buNone/>
-            </a:pPr>
-            <a:r>
-              <a:rPr lang="en-US" dirty="0"/>
-              <a:t>servicerequirestoprocessthemessage.SOAPmessagesarewritteninXMLsothatthey’re</a:t>
-            </a:r>
-          </a:p>
-          <a:p>
-            <a:pPr marL="0" indent="0">
-              <a:buNone/>
-            </a:pPr>
-            <a:endParaRPr lang="en-US" dirty="0"/>
-          </a:p>
-          <a:p>
-            <a:pPr marL="0" indent="0">
-              <a:buNone/>
-            </a:pPr>
-            <a:r>
-              <a:rPr lang="en-US" dirty="0" err="1"/>
-              <a:t>computerreadable,humanreadableandplatformindependent</a:t>
-            </a:r>
-            <a:r>
-              <a:rPr lang="en-US" dirty="0"/>
-              <a:t>.</a:t>
-            </a:r>
           </a:p>
         </p:txBody>
       </p:sp>
@@ -10821,7 +11161,7 @@
   <p:timing>
     <p:tnLst>
       <p:par>
-        <p:cTn xmlns:p14="http://schemas.microsoft.com/office/powerpoint/2010/main" id="1" dur="indefinite" restart="never" nodeType="tmRoot"/>
+        <p:cTn id="1" dur="indefinite" restart="never" nodeType="tmRoot"/>
       </p:par>
     </p:tnLst>
   </p:timing>
@@ -10831,6 +11171,29 @@
 <file path=ppt/slides/slide8.xml><?xml version="1.0" encoding="utf-8"?>
 <p:sld xmlns:a="http://schemas.openxmlformats.org/drawingml/2006/main" xmlns:r="http://schemas.openxmlformats.org/officeDocument/2006/relationships" xmlns:p="http://schemas.openxmlformats.org/presentationml/2006/main">
   <p:cSld>
+    <p:bg>
+      <p:bgPr>
+        <a:gradFill flip="none" rotWithShape="1">
+          <a:gsLst>
+            <a:gs pos="100000">
+              <a:schemeClr val="bg2">
+                <a:lumMod val="25000"/>
+                <a:alpha val="68000"/>
+              </a:schemeClr>
+            </a:gs>
+            <a:gs pos="55000">
+              <a:schemeClr val="bg2">
+                <a:lumMod val="50000"/>
+                <a:alpha val="30000"/>
+              </a:schemeClr>
+            </a:gs>
+          </a:gsLst>
+          <a:lin ang="5400000" scaled="0"/>
+          <a:tileRect/>
+        </a:gradFill>
+        <a:effectLst/>
+      </p:bgPr>
+    </p:bg>
     <p:spTree>
       <p:nvGrpSpPr>
         <p:cNvPr id="1" name=""/>
@@ -10847,7 +11210,48 @@
       </p:grpSpPr>
       <p:sp>
         <p:nvSpPr>
-          <p:cNvPr id="2" name="Title 1"/>
+          <p:cNvPr id="3" name="Content Placeholder 2"/>
+          <p:cNvSpPr>
+            <a:spLocks noGrp="1"/>
+          </p:cNvSpPr>
+          <p:nvPr>
+            <p:ph idx="1"/>
+          </p:nvPr>
+        </p:nvSpPr>
+        <p:spPr>
+          <a:xfrm>
+            <a:off x="457200" y="1173238"/>
+            <a:ext cx="8229600" cy="4952925"/>
+          </a:xfrm>
+        </p:spPr>
+        <p:txBody>
+          <a:bodyPr/>
+          <a:lstStyle/>
+          <a:p>
+            <a:pPr marL="0" indent="0" algn="ctr">
+              <a:buNone/>
+            </a:pPr>
+            <a:r>
+              <a:rPr lang="en-US" sz="6000" b="1" dirty="0"/>
+              <a:t>Using </a:t>
+            </a:r>
+            <a:r>
+              <a:rPr lang="en-US" sz="6000" b="1" dirty="0" smtClean="0"/>
+              <a:t>the Weather Underground REST API</a:t>
+            </a:r>
+            <a:endParaRPr lang="en-US" sz="6000" b="1" dirty="0"/>
+          </a:p>
+          <a:p>
+            <a:pPr marL="0" indent="0">
+              <a:buNone/>
+            </a:pPr>
+            <a:endParaRPr lang="en-US" dirty="0"/>
+          </a:p>
+        </p:txBody>
+      </p:sp>
+      <p:sp>
+        <p:nvSpPr>
+          <p:cNvPr id="4" name="Title 3"/>
           <p:cNvSpPr>
             <a:spLocks noGrp="1"/>
           </p:cNvSpPr>
@@ -10857,106 +11261,29 @@
         </p:nvSpPr>
         <p:spPr/>
         <p:txBody>
-          <a:bodyPr>
-            <a:normAutofit/>
-          </a:bodyPr>
+          <a:bodyPr/>
           <a:lstStyle/>
           <a:p>
             <a:r>
-              <a:rPr lang="en-US" dirty="0" smtClean="0"/>
-              <a:t>WSDL</a:t>
-            </a:r>
-            <a:endParaRPr lang="en-US" dirty="0"/>
-          </a:p>
-        </p:txBody>
-      </p:sp>
-      <p:sp>
-        <p:nvSpPr>
-          <p:cNvPr id="3" name="Content Placeholder 2"/>
-          <p:cNvSpPr>
-            <a:spLocks noGrp="1"/>
-          </p:cNvSpPr>
-          <p:nvPr>
-            <p:ph idx="1"/>
-          </p:nvPr>
-        </p:nvSpPr>
-        <p:spPr/>
-        <p:txBody>
-          <a:bodyPr>
-            <a:normAutofit/>
-          </a:bodyPr>
-          <a:lstStyle/>
-          <a:p>
-            <a:r>
-              <a:rPr lang="en-US" dirty="0"/>
-              <a:t>Web Services Description Layer</a:t>
-            </a:r>
-          </a:p>
-          <a:p>
-            <a:r>
-              <a:rPr lang="en-US" dirty="0"/>
-              <a:t>An XML document that describes a web service</a:t>
-            </a:r>
-          </a:p>
-          <a:p>
-            <a:r>
-              <a:rPr lang="en-US" dirty="0"/>
-              <a:t>The main elements in a WSDL document:</a:t>
-            </a:r>
-          </a:p>
-          <a:p>
-            <a:pPr marL="457200" lvl="1" indent="0">
-              <a:buNone/>
-            </a:pPr>
-            <a:r>
-              <a:rPr lang="en-US" dirty="0"/>
-              <a:t>&lt;types&gt; 		Contains data type definitions</a:t>
-            </a:r>
-          </a:p>
-          <a:p>
-            <a:pPr marL="457200" lvl="1" indent="0">
-              <a:buNone/>
-            </a:pPr>
-            <a:r>
-              <a:rPr lang="en-US" dirty="0"/>
-              <a:t>&lt;message&gt;	Definition of the data being sent</a:t>
-            </a:r>
-          </a:p>
-          <a:p>
-            <a:pPr marL="457200" lvl="1" indent="0">
-              <a:buNone/>
-            </a:pPr>
-            <a:r>
-              <a:rPr lang="en-US" dirty="0"/>
-              <a:t>&lt;</a:t>
-            </a:r>
-            <a:r>
-              <a:rPr lang="en-US" dirty="0" err="1"/>
-              <a:t>portType</a:t>
-            </a:r>
-            <a:r>
-              <a:rPr lang="en-US" dirty="0"/>
-              <a:t>&gt;	List of operations </a:t>
-            </a:r>
-          </a:p>
-          <a:p>
-            <a:pPr marL="457200" lvl="1" indent="0">
-              <a:buNone/>
-            </a:pPr>
-            <a:r>
-              <a:rPr lang="en-US" dirty="0"/>
-              <a:t>&lt;binding&gt;	Protocol and data format for port type</a:t>
-            </a:r>
-          </a:p>
-          <a:p>
-            <a:endParaRPr lang="en-US" dirty="0"/>
+              <a:rPr lang="en-US" b="1" dirty="0" smtClean="0">
+                <a:solidFill>
+                  <a:srgbClr val="0000FF"/>
+                </a:solidFill>
+              </a:rPr>
+              <a:t>Code Tour</a:t>
+            </a:r>
+            <a:endParaRPr lang="en-US" b="1" dirty="0">
+              <a:solidFill>
+                <a:srgbClr val="0000FF"/>
+              </a:solidFill>
+            </a:endParaRPr>
           </a:p>
         </p:txBody>
       </p:sp>
     </p:spTree>
     <p:extLst>
       <p:ext uri="{BB962C8B-B14F-4D97-AF65-F5344CB8AC3E}">
-        <p14:creationId xmlns:p14="http://schemas.microsoft.com/office/powerpoint/2010/main" val="885899410"/>
+        <p14:creationId xmlns:p14="http://schemas.microsoft.com/office/powerpoint/2010/main" val="3792523372"/>
       </p:ext>
     </p:extLst>
   </p:cSld>
@@ -10966,7 +11293,7 @@
   <p:timing>
     <p:tnLst>
       <p:par>
-        <p:cTn xmlns:p14="http://schemas.microsoft.com/office/powerpoint/2010/main" id="1" dur="indefinite" restart="never" nodeType="tmRoot"/>
+        <p:cTn id="1" dur="indefinite" restart="never" nodeType="tmRoot"/>
       </p:par>
     </p:tnLst>
   </p:timing>
@@ -11007,7 +11334,7 @@
           <a:p>
             <a:r>
               <a:rPr lang="en-US" dirty="0" smtClean="0"/>
-              <a:t>SOAP Messages</a:t>
+              <a:t>SOAP Protocol</a:t>
             </a:r>
             <a:endParaRPr lang="en-US" dirty="0"/>
           </a:p>
@@ -11026,71 +11353,106 @@
         <p:spPr/>
         <p:txBody>
           <a:bodyPr>
-            <a:normAutofit/>
+            <a:normAutofit fontScale="70000" lnSpcReduction="20000"/>
           </a:bodyPr>
           <a:lstStyle/>
           <a:p>
-            <a:r>
-              <a:rPr lang="en-US" dirty="0" smtClean="0"/>
-              <a:t>Used for Request and Response</a:t>
+            <a:pPr marL="0" indent="0">
+              <a:buNone/>
+            </a:pPr>
+            <a:r>
+              <a:rPr lang="en-US" dirty="0" err="1"/>
+              <a:t>TheSimpleObjectAccessProtocol</a:t>
+            </a:r>
+            <a:r>
+              <a:rPr lang="en-US" dirty="0"/>
+              <a:t>(SOAP)</a:t>
+            </a:r>
+            <a:r>
+              <a:rPr lang="en-US" dirty="0" err="1"/>
+              <a:t>isaplatform-independentprotocolthatuses</a:t>
             </a:r>
             <a:endParaRPr lang="en-US" dirty="0"/>
           </a:p>
           <a:p>
+            <a:pPr marL="0" indent="0">
+              <a:buNone/>
+            </a:pPr>
+            <a:endParaRPr lang="en-US" dirty="0"/>
+          </a:p>
+          <a:p>
+            <a:pPr marL="0" indent="0">
+              <a:buNone/>
+            </a:pPr>
             <a:r>
               <a:rPr lang="en-US" dirty="0"/>
-              <a:t>A SOAP message is an XML document (not a file) with these elements:</a:t>
-            </a:r>
-          </a:p>
-          <a:p>
-            <a:pPr lvl="1">
-              <a:buFont typeface="Courier New"/>
-              <a:buChar char="o"/>
+              <a:t>XMLtomakeremoteprocedurecalls,typicallyoverHTTP.Eachrequestandresponseis</a:t>
+            </a:r>
+          </a:p>
+          <a:p>
+            <a:pPr marL="0" indent="0">
+              <a:buNone/>
             </a:pPr>
+            <a:endParaRPr lang="en-US" dirty="0"/>
+          </a:p>
+          <a:p>
+            <a:pPr marL="0" indent="0">
+              <a:buNone/>
+            </a:pPr>
+            <a:r>
+              <a:rPr lang="en-US" dirty="0" err="1"/>
+              <a:t>packagedinaSOAPmessage</a:t>
+            </a:r>
             <a:r>
               <a:rPr lang="en-US" dirty="0"/>
-              <a:t>Header</a:t>
-            </a:r>
-          </a:p>
-          <a:p>
-            <a:pPr lvl="1">
-              <a:buFont typeface="Courier New"/>
-              <a:buChar char="o"/>
+              <a:t>—</a:t>
+            </a:r>
+            <a:r>
+              <a:rPr lang="en-US" dirty="0" err="1"/>
+              <a:t>anXMLmessagecontainingtheinformationthataweb</a:t>
+            </a:r>
+            <a:endParaRPr lang="en-US" dirty="0"/>
+          </a:p>
+          <a:p>
+            <a:pPr marL="0" indent="0">
+              <a:buNone/>
             </a:pPr>
+            <a:endParaRPr lang="en-US" dirty="0"/>
+          </a:p>
+          <a:p>
+            <a:pPr marL="0" indent="0">
+              <a:buNone/>
+            </a:pPr>
             <a:r>
               <a:rPr lang="en-US" dirty="0"/>
-              <a:t>Body</a:t>
-            </a:r>
-          </a:p>
-          <a:p>
-            <a:pPr lvl="1">
-              <a:buFont typeface="Courier New"/>
-              <a:buChar char="o"/>
+              <a:t>servicerequirestoprocessthemessage.SOAPmessagesarewritteninXMLsothatthey’re</a:t>
+            </a:r>
+          </a:p>
+          <a:p>
+            <a:pPr marL="0" indent="0">
+              <a:buNone/>
             </a:pPr>
+            <a:endParaRPr lang="en-US" dirty="0"/>
+          </a:p>
+          <a:p>
+            <a:pPr marL="0" indent="0">
+              <a:buNone/>
+            </a:pPr>
+            <a:r>
+              <a:rPr lang="en-US" dirty="0" err="1"/>
+              <a:t>computerreadable,humanreadableandplatformindependent</a:t>
+            </a:r>
             <a:r>
               <a:rPr lang="en-US" dirty="0"/>
-              <a:t>Fault</a:t>
-            </a:r>
-          </a:p>
-          <a:p>
-            <a:pPr lvl="1">
-              <a:buFont typeface="Courier New"/>
-              <a:buChar char="o"/>
-            </a:pPr>
-            <a:r>
-              <a:rPr lang="en-US" dirty="0"/>
-              <a:t>Envelope</a:t>
-            </a:r>
-          </a:p>
-          <a:p>
-            <a:endParaRPr lang="en-US" dirty="0"/>
+              <a:t>.</a:t>
+            </a:r>
           </a:p>
         </p:txBody>
       </p:sp>
     </p:spTree>
     <p:extLst>
       <p:ext uri="{BB962C8B-B14F-4D97-AF65-F5344CB8AC3E}">
-        <p14:creationId xmlns:p14="http://schemas.microsoft.com/office/powerpoint/2010/main" val="644461026"/>
+        <p14:creationId xmlns:p14="http://schemas.microsoft.com/office/powerpoint/2010/main" val="929819204"/>
       </p:ext>
     </p:extLst>
   </p:cSld>
@@ -11100,7 +11462,7 @@
   <p:timing>
     <p:tnLst>
       <p:par>
-        <p:cTn xmlns:p14="http://schemas.microsoft.com/office/powerpoint/2010/main" id="1" dur="indefinite" restart="never" nodeType="tmRoot"/>
+        <p:cTn id="1" dur="indefinite" restart="never" nodeType="tmRoot"/>
       </p:par>
     </p:tnLst>
   </p:timing>

</xml_diff>